<commit_message>
Adds SDLC Slides to cybersecurity-iacs
</commit_message>
<xml_diff>
--- a/cybersecurity-iacs/Rod/SLC_and_SDLC.pptx
+++ b/cybersecurity-iacs/Rod/SLC_and_SDLC.pptx
@@ -5,10 +5,10 @@
     <p:sldMasterId id="2147483651" r:id="rId1"/>
   </p:sldMasterIdLst>
   <p:notesMasterIdLst>
-    <p:notesMasterId r:id="rId22"/>
+    <p:notesMasterId r:id="rId39"/>
   </p:notesMasterIdLst>
   <p:handoutMasterIdLst>
-    <p:handoutMasterId r:id="rId23"/>
+    <p:handoutMasterId r:id="rId40"/>
   </p:handoutMasterIdLst>
   <p:sldIdLst>
     <p:sldId id="256" r:id="rId2"/>
@@ -31,6 +31,23 @@
     <p:sldId id="274" r:id="rId19"/>
     <p:sldId id="275" r:id="rId20"/>
     <p:sldId id="276" r:id="rId21"/>
+    <p:sldId id="277" r:id="rId22"/>
+    <p:sldId id="278" r:id="rId23"/>
+    <p:sldId id="279" r:id="rId24"/>
+    <p:sldId id="280" r:id="rId25"/>
+    <p:sldId id="281" r:id="rId26"/>
+    <p:sldId id="282" r:id="rId27"/>
+    <p:sldId id="283" r:id="rId28"/>
+    <p:sldId id="284" r:id="rId29"/>
+    <p:sldId id="285" r:id="rId30"/>
+    <p:sldId id="286" r:id="rId31"/>
+    <p:sldId id="287" r:id="rId32"/>
+    <p:sldId id="288" r:id="rId33"/>
+    <p:sldId id="289" r:id="rId34"/>
+    <p:sldId id="290" r:id="rId35"/>
+    <p:sldId id="291" r:id="rId36"/>
+    <p:sldId id="292" r:id="rId37"/>
+    <p:sldId id="293" r:id="rId38"/>
   </p:sldIdLst>
   <p:sldSz cx="9372600" cy="8297863"/>
   <p:notesSz cx="7315200" cy="9601200"/>
@@ -893,6 +910,250 @@
 </p:notes>
 </file>
 
+<file path=ppt/notesSlides/notesSlide10.xml><?xml version="1.0" encoding="utf-8"?>
+<p:notes xmlns:a="http://schemas.openxmlformats.org/drawingml/2006/main" xmlns:r="http://schemas.openxmlformats.org/officeDocument/2006/relationships" xmlns:p="http://schemas.openxmlformats.org/presentationml/2006/main">
+  <p:cSld>
+    <p:spTree>
+      <p:nvGrpSpPr>
+        <p:cNvPr id="1" name=""/>
+        <p:cNvGrpSpPr/>
+        <p:nvPr/>
+      </p:nvGrpSpPr>
+      <p:grpSpPr>
+        <a:xfrm>
+          <a:off x="0" y="0"/>
+          <a:ext cx="0" cy="0"/>
+          <a:chOff x="0" y="0"/>
+          <a:chExt cx="0" cy="0"/>
+        </a:xfrm>
+      </p:grpSpPr>
+      <p:sp>
+        <p:nvSpPr>
+          <p:cNvPr id="2" name="Slide Image Placeholder 1"/>
+          <p:cNvSpPr>
+            <a:spLocks noGrp="1" noRot="1" noChangeAspect="1"/>
+          </p:cNvSpPr>
+          <p:nvPr>
+            <p:ph type="sldImg"/>
+          </p:nvPr>
+        </p:nvSpPr>
+        <p:spPr/>
+      </p:sp>
+      <p:sp>
+        <p:nvSpPr>
+          <p:cNvPr id="3" name="Notes Placeholder 2"/>
+          <p:cNvSpPr>
+            <a:spLocks noGrp="1"/>
+          </p:cNvSpPr>
+          <p:nvPr>
+            <p:ph type="body" idx="1"/>
+          </p:nvPr>
+        </p:nvSpPr>
+        <p:spPr/>
+        <p:txBody>
+          <a:bodyPr/>
+          <a:lstStyle/>
+          <a:p>
+            <a:r>
+              <a:rPr lang="en-US" dirty="0"/>
+              <a:t>Image is from DoD Document – public domain</a:t>
+            </a:r>
+            <a:endParaRPr lang="en-CA" dirty="0"/>
+          </a:p>
+        </p:txBody>
+      </p:sp>
+      <p:sp>
+        <p:nvSpPr>
+          <p:cNvPr id="4" name="Footer Placeholder 3"/>
+          <p:cNvSpPr>
+            <a:spLocks noGrp="1"/>
+          </p:cNvSpPr>
+          <p:nvPr>
+            <p:ph type="ftr" sz="quarter" idx="4"/>
+          </p:nvPr>
+        </p:nvSpPr>
+        <p:spPr/>
+        <p:txBody>
+          <a:bodyPr/>
+          <a:lstStyle/>
+          <a:p>
+            <a:pPr>
+              <a:defRPr/>
+            </a:pPr>
+            <a:r>
+              <a:rPr lang="en-US"/>
+              <a:t>Copyright © 2017 Elephant Scale. All rights reserved.</a:t>
+            </a:r>
+            <a:endParaRPr lang="en-US" dirty="0"/>
+          </a:p>
+        </p:txBody>
+      </p:sp>
+      <p:sp>
+        <p:nvSpPr>
+          <p:cNvPr id="5" name="Slide Number Placeholder 4"/>
+          <p:cNvSpPr>
+            <a:spLocks noGrp="1"/>
+          </p:cNvSpPr>
+          <p:nvPr>
+            <p:ph type="sldNum" sz="quarter" idx="5"/>
+          </p:nvPr>
+        </p:nvSpPr>
+        <p:spPr/>
+        <p:txBody>
+          <a:bodyPr/>
+          <a:lstStyle/>
+          <a:p>
+            <a:pPr>
+              <a:defRPr/>
+            </a:pPr>
+            <a:fld id="{EFAADD5D-AF76-45EE-AA5F-6DAC73BF167A}" type="slidenum">
+              <a:rPr lang="en-US" smtClean="0"/>
+              <a:pPr>
+                <a:defRPr/>
+              </a:pPr>
+              <a:t>34</a:t>
+            </a:fld>
+            <a:endParaRPr lang="en-US" dirty="0"/>
+          </a:p>
+        </p:txBody>
+      </p:sp>
+    </p:spTree>
+    <p:extLst>
+      <p:ext uri="{BB962C8B-B14F-4D97-AF65-F5344CB8AC3E}">
+        <p14:creationId xmlns:p14="http://schemas.microsoft.com/office/powerpoint/2010/main" val="1515760970"/>
+      </p:ext>
+    </p:extLst>
+  </p:cSld>
+  <p:clrMapOvr>
+    <a:masterClrMapping/>
+  </p:clrMapOvr>
+</p:notes>
+</file>
+
+<file path=ppt/notesSlides/notesSlide11.xml><?xml version="1.0" encoding="utf-8"?>
+<p:notes xmlns:a="http://schemas.openxmlformats.org/drawingml/2006/main" xmlns:r="http://schemas.openxmlformats.org/officeDocument/2006/relationships" xmlns:p="http://schemas.openxmlformats.org/presentationml/2006/main">
+  <p:cSld>
+    <p:spTree>
+      <p:nvGrpSpPr>
+        <p:cNvPr id="1" name=""/>
+        <p:cNvGrpSpPr/>
+        <p:nvPr/>
+      </p:nvGrpSpPr>
+      <p:grpSpPr>
+        <a:xfrm>
+          <a:off x="0" y="0"/>
+          <a:ext cx="0" cy="0"/>
+          <a:chOff x="0" y="0"/>
+          <a:chExt cx="0" cy="0"/>
+        </a:xfrm>
+      </p:grpSpPr>
+      <p:sp>
+        <p:nvSpPr>
+          <p:cNvPr id="2" name="Slide Image Placeholder 1"/>
+          <p:cNvSpPr>
+            <a:spLocks noGrp="1" noRot="1" noChangeAspect="1"/>
+          </p:cNvSpPr>
+          <p:nvPr>
+            <p:ph type="sldImg"/>
+          </p:nvPr>
+        </p:nvSpPr>
+        <p:spPr/>
+      </p:sp>
+      <p:sp>
+        <p:nvSpPr>
+          <p:cNvPr id="3" name="Notes Placeholder 2"/>
+          <p:cNvSpPr>
+            <a:spLocks noGrp="1"/>
+          </p:cNvSpPr>
+          <p:nvPr>
+            <p:ph type="body" idx="1"/>
+          </p:nvPr>
+        </p:nvSpPr>
+        <p:spPr/>
+        <p:txBody>
+          <a:bodyPr/>
+          <a:lstStyle/>
+          <a:p>
+            <a:r>
+              <a:rPr lang="en-US" dirty="0"/>
+              <a:t>From the IBM website on </a:t>
+            </a:r>
+            <a:r>
+              <a:rPr lang="en-US" dirty="0" err="1"/>
+              <a:t>devsecops</a:t>
+            </a:r>
+            <a:endParaRPr lang="en-CA" dirty="0"/>
+          </a:p>
+        </p:txBody>
+      </p:sp>
+      <p:sp>
+        <p:nvSpPr>
+          <p:cNvPr id="4" name="Footer Placeholder 3"/>
+          <p:cNvSpPr>
+            <a:spLocks noGrp="1"/>
+          </p:cNvSpPr>
+          <p:nvPr>
+            <p:ph type="ftr" sz="quarter" idx="4"/>
+          </p:nvPr>
+        </p:nvSpPr>
+        <p:spPr/>
+        <p:txBody>
+          <a:bodyPr/>
+          <a:lstStyle/>
+          <a:p>
+            <a:pPr>
+              <a:defRPr/>
+            </a:pPr>
+            <a:r>
+              <a:rPr lang="en-US"/>
+              <a:t>Copyright © 2017 Elephant Scale. All rights reserved.</a:t>
+            </a:r>
+            <a:endParaRPr lang="en-US" dirty="0"/>
+          </a:p>
+        </p:txBody>
+      </p:sp>
+      <p:sp>
+        <p:nvSpPr>
+          <p:cNvPr id="5" name="Slide Number Placeholder 4"/>
+          <p:cNvSpPr>
+            <a:spLocks noGrp="1"/>
+          </p:cNvSpPr>
+          <p:nvPr>
+            <p:ph type="sldNum" sz="quarter" idx="5"/>
+          </p:nvPr>
+        </p:nvSpPr>
+        <p:spPr/>
+        <p:txBody>
+          <a:bodyPr/>
+          <a:lstStyle/>
+          <a:p>
+            <a:pPr>
+              <a:defRPr/>
+            </a:pPr>
+            <a:fld id="{EFAADD5D-AF76-45EE-AA5F-6DAC73BF167A}" type="slidenum">
+              <a:rPr lang="en-US" smtClean="0"/>
+              <a:pPr>
+                <a:defRPr/>
+              </a:pPr>
+              <a:t>35</a:t>
+            </a:fld>
+            <a:endParaRPr lang="en-US" dirty="0"/>
+          </a:p>
+        </p:txBody>
+      </p:sp>
+    </p:spTree>
+    <p:extLst>
+      <p:ext uri="{BB962C8B-B14F-4D97-AF65-F5344CB8AC3E}">
+        <p14:creationId xmlns:p14="http://schemas.microsoft.com/office/powerpoint/2010/main" val="255442919"/>
+      </p:ext>
+    </p:extLst>
+  </p:cSld>
+  <p:clrMapOvr>
+    <a:masterClrMapping/>
+  </p:clrMapOvr>
+</p:notes>
+</file>
+
 <file path=ppt/notesSlides/notesSlide2.xml><?xml version="1.0" encoding="utf-8"?>
 <p:notes xmlns:a="http://schemas.openxmlformats.org/drawingml/2006/main" xmlns:r="http://schemas.openxmlformats.org/officeDocument/2006/relationships" xmlns:p="http://schemas.openxmlformats.org/presentationml/2006/main">
   <p:cSld>
@@ -1766,6 +2027,126 @@
     <p:extLst>
       <p:ext uri="{BB962C8B-B14F-4D97-AF65-F5344CB8AC3E}">
         <p14:creationId xmlns:p14="http://schemas.microsoft.com/office/powerpoint/2010/main" val="866816319"/>
+      </p:ext>
+    </p:extLst>
+  </p:cSld>
+  <p:clrMapOvr>
+    <a:masterClrMapping/>
+  </p:clrMapOvr>
+</p:notes>
+</file>
+
+<file path=ppt/notesSlides/notesSlide9.xml><?xml version="1.0" encoding="utf-8"?>
+<p:notes xmlns:a="http://schemas.openxmlformats.org/drawingml/2006/main" xmlns:r="http://schemas.openxmlformats.org/officeDocument/2006/relationships" xmlns:p="http://schemas.openxmlformats.org/presentationml/2006/main">
+  <p:cSld>
+    <p:spTree>
+      <p:nvGrpSpPr>
+        <p:cNvPr id="1" name=""/>
+        <p:cNvGrpSpPr/>
+        <p:nvPr/>
+      </p:nvGrpSpPr>
+      <p:grpSpPr>
+        <a:xfrm>
+          <a:off x="0" y="0"/>
+          <a:ext cx="0" cy="0"/>
+          <a:chOff x="0" y="0"/>
+          <a:chExt cx="0" cy="0"/>
+        </a:xfrm>
+      </p:grpSpPr>
+      <p:sp>
+        <p:nvSpPr>
+          <p:cNvPr id="2" name="Slide Image Placeholder 1"/>
+          <p:cNvSpPr>
+            <a:spLocks noGrp="1" noRot="1" noChangeAspect="1"/>
+          </p:cNvSpPr>
+          <p:nvPr>
+            <p:ph type="sldImg"/>
+          </p:nvPr>
+        </p:nvSpPr>
+        <p:spPr/>
+      </p:sp>
+      <p:sp>
+        <p:nvSpPr>
+          <p:cNvPr id="3" name="Notes Placeholder 2"/>
+          <p:cNvSpPr>
+            <a:spLocks noGrp="1"/>
+          </p:cNvSpPr>
+          <p:nvPr>
+            <p:ph type="body" idx="1"/>
+          </p:nvPr>
+        </p:nvSpPr>
+        <p:spPr/>
+        <p:txBody>
+          <a:bodyPr/>
+          <a:lstStyle/>
+          <a:p>
+            <a:r>
+              <a:rPr lang="en-US" dirty="0"/>
+              <a:t>Taken from the IEEE standard “Best Practices for Software Requirements Specifications”</a:t>
+            </a:r>
+            <a:endParaRPr lang="en-CA" dirty="0"/>
+          </a:p>
+        </p:txBody>
+      </p:sp>
+      <p:sp>
+        <p:nvSpPr>
+          <p:cNvPr id="4" name="Footer Placeholder 3"/>
+          <p:cNvSpPr>
+            <a:spLocks noGrp="1"/>
+          </p:cNvSpPr>
+          <p:nvPr>
+            <p:ph type="ftr" sz="quarter" idx="4"/>
+          </p:nvPr>
+        </p:nvSpPr>
+        <p:spPr/>
+        <p:txBody>
+          <a:bodyPr/>
+          <a:lstStyle/>
+          <a:p>
+            <a:pPr>
+              <a:defRPr/>
+            </a:pPr>
+            <a:r>
+              <a:rPr lang="en-US"/>
+              <a:t>Copyright © 2017 Elephant Scale. All rights reserved.</a:t>
+            </a:r>
+            <a:endParaRPr lang="en-US" dirty="0"/>
+          </a:p>
+        </p:txBody>
+      </p:sp>
+      <p:sp>
+        <p:nvSpPr>
+          <p:cNvPr id="5" name="Slide Number Placeholder 4"/>
+          <p:cNvSpPr>
+            <a:spLocks noGrp="1"/>
+          </p:cNvSpPr>
+          <p:nvPr>
+            <p:ph type="sldNum" sz="quarter" idx="5"/>
+          </p:nvPr>
+        </p:nvSpPr>
+        <p:spPr/>
+        <p:txBody>
+          <a:bodyPr/>
+          <a:lstStyle/>
+          <a:p>
+            <a:pPr>
+              <a:defRPr/>
+            </a:pPr>
+            <a:fld id="{EFAADD5D-AF76-45EE-AA5F-6DAC73BF167A}" type="slidenum">
+              <a:rPr lang="en-US" smtClean="0"/>
+              <a:pPr>
+                <a:defRPr/>
+              </a:pPr>
+              <a:t>29</a:t>
+            </a:fld>
+            <a:endParaRPr lang="en-US" dirty="0"/>
+          </a:p>
+        </p:txBody>
+      </p:sp>
+    </p:spTree>
+    <p:extLst>
+      <p:ext uri="{BB962C8B-B14F-4D97-AF65-F5344CB8AC3E}">
+        <p14:creationId xmlns:p14="http://schemas.microsoft.com/office/powerpoint/2010/main" val="3475154023"/>
       </p:ext>
     </p:extLst>
   </p:cSld>
@@ -2016,7 +2397,7 @@
             </a:pPr>
             <a:r>
               <a:rPr lang="en-US" dirty="0"/>
-              <a:t>Copyright © 2017 Elephant Scale. All rights reserved.</a:t>
+              <a:t>Copyright © 2021 Elephant Scale. All rights reserved.</a:t>
             </a:r>
           </a:p>
         </p:txBody>
@@ -2331,7 +2712,7 @@
             </a:pPr>
             <a:r>
               <a:rPr lang="en-US" dirty="0"/>
-              <a:t>Copyright © 2017 Elephant Scale. All rights reserved.</a:t>
+              <a:t>Copyright © 2021 Elephant Scale. All rights reserved.</a:t>
             </a:r>
           </a:p>
         </p:txBody>
@@ -2561,7 +2942,7 @@
             </a:pPr>
             <a:r>
               <a:rPr lang="en-US" dirty="0"/>
-              <a:t>Copyright © 2017 Elephant Scale. All rights reserved.</a:t>
+              <a:t>Copyright © 2021 Elephant Scale. All rights reserved.</a:t>
             </a:r>
           </a:p>
         </p:txBody>
@@ -2785,7 +3166,7 @@
             </a:pPr>
             <a:r>
               <a:rPr lang="en-US" dirty="0"/>
-              <a:t>Copyright © 2017 Elephant Scale. All rights reserved.</a:t>
+              <a:t>Copyright © 2021 Elephant Scale. All rights reserved.</a:t>
             </a:r>
           </a:p>
         </p:txBody>
@@ -5709,6 +6090,2213 @@
 </p:sld>
 </file>
 
+<file path=ppt/slides/slide21.xml><?xml version="1.0" encoding="utf-8"?>
+<p:sld xmlns:a="http://schemas.openxmlformats.org/drawingml/2006/main" xmlns:r="http://schemas.openxmlformats.org/officeDocument/2006/relationships" xmlns:p="http://schemas.openxmlformats.org/presentationml/2006/main">
+  <p:cSld>
+    <p:spTree>
+      <p:nvGrpSpPr>
+        <p:cNvPr id="1" name=""/>
+        <p:cNvGrpSpPr/>
+        <p:nvPr/>
+      </p:nvGrpSpPr>
+      <p:grpSpPr>
+        <a:xfrm>
+          <a:off x="0" y="0"/>
+          <a:ext cx="0" cy="0"/>
+          <a:chOff x="0" y="0"/>
+          <a:chExt cx="0" cy="0"/>
+        </a:xfrm>
+      </p:grpSpPr>
+      <p:sp>
+        <p:nvSpPr>
+          <p:cNvPr id="2" name="Title 1">
+            <a:extLst>
+              <a:ext uri="{FF2B5EF4-FFF2-40B4-BE49-F238E27FC236}">
+                <a16:creationId xmlns:a16="http://schemas.microsoft.com/office/drawing/2014/main" id="{57AD2439-3DC5-455E-96EC-40AF7DE7A142}"/>
+              </a:ext>
+            </a:extLst>
+          </p:cNvPr>
+          <p:cNvSpPr>
+            <a:spLocks noGrp="1"/>
+          </p:cNvSpPr>
+          <p:nvPr>
+            <p:ph type="title"/>
+          </p:nvPr>
+        </p:nvSpPr>
+        <p:spPr/>
+        <p:txBody>
+          <a:bodyPr/>
+          <a:lstStyle/>
+          <a:p>
+            <a:r>
+              <a:rPr lang="en-US" dirty="0"/>
+              <a:t>SDLC</a:t>
+            </a:r>
+            <a:endParaRPr lang="en-CA" dirty="0"/>
+          </a:p>
+        </p:txBody>
+      </p:sp>
+      <p:sp>
+        <p:nvSpPr>
+          <p:cNvPr id="3" name="Content Placeholder 2">
+            <a:extLst>
+              <a:ext uri="{FF2B5EF4-FFF2-40B4-BE49-F238E27FC236}">
+                <a16:creationId xmlns:a16="http://schemas.microsoft.com/office/drawing/2014/main" id="{811F27C4-1BDC-47CB-8BC1-A74FC8C2F411}"/>
+              </a:ext>
+            </a:extLst>
+          </p:cNvPr>
+          <p:cNvSpPr>
+            <a:spLocks noGrp="1"/>
+          </p:cNvSpPr>
+          <p:nvPr>
+            <p:ph idx="1"/>
+          </p:nvPr>
+        </p:nvSpPr>
+        <p:spPr>
+          <a:xfrm>
+            <a:off x="234950" y="994976"/>
+            <a:ext cx="8902700" cy="1706155"/>
+          </a:xfrm>
+        </p:spPr>
+        <p:txBody>
+          <a:bodyPr/>
+          <a:lstStyle/>
+          <a:p>
+            <a:r>
+              <a:rPr lang="en-US" dirty="0"/>
+              <a:t>Software Development Lifecycle</a:t>
+            </a:r>
+          </a:p>
+          <a:p>
+            <a:pPr lvl="1"/>
+            <a:r>
+              <a:rPr lang="en-US" dirty="0"/>
+              <a:t>Defines the organization of work during the construction phase</a:t>
+            </a:r>
+          </a:p>
+          <a:p>
+            <a:pPr lvl="1"/>
+            <a:r>
+              <a:rPr lang="en-US" dirty="0"/>
+              <a:t>Follows the Engineering process from requirements to deployment</a:t>
+            </a:r>
+            <a:endParaRPr lang="en-CA" dirty="0"/>
+          </a:p>
+        </p:txBody>
+      </p:sp>
+      <p:sp>
+        <p:nvSpPr>
+          <p:cNvPr id="4" name="Footer Placeholder 3">
+            <a:extLst>
+              <a:ext uri="{FF2B5EF4-FFF2-40B4-BE49-F238E27FC236}">
+                <a16:creationId xmlns:a16="http://schemas.microsoft.com/office/drawing/2014/main" id="{9E2D528B-75F6-4CD5-9735-BAE55A987C54}"/>
+              </a:ext>
+            </a:extLst>
+          </p:cNvPr>
+          <p:cNvSpPr>
+            <a:spLocks noGrp="1"/>
+          </p:cNvSpPr>
+          <p:nvPr>
+            <p:ph type="ftr" sz="quarter" idx="11"/>
+          </p:nvPr>
+        </p:nvSpPr>
+        <p:spPr/>
+        <p:txBody>
+          <a:bodyPr/>
+          <a:lstStyle/>
+          <a:p>
+            <a:pPr algn="l">
+              <a:defRPr/>
+            </a:pPr>
+            <a:r>
+              <a:rPr lang="en-US"/>
+              <a:t>Copyright © 2021 Elephant Scale. All rights reserved.</a:t>
+            </a:r>
+            <a:endParaRPr lang="en-US" dirty="0"/>
+          </a:p>
+        </p:txBody>
+      </p:sp>
+      <p:sp>
+        <p:nvSpPr>
+          <p:cNvPr id="5" name="Slide Number Placeholder 4">
+            <a:extLst>
+              <a:ext uri="{FF2B5EF4-FFF2-40B4-BE49-F238E27FC236}">
+                <a16:creationId xmlns:a16="http://schemas.microsoft.com/office/drawing/2014/main" id="{FFCB9888-D626-4880-A97C-D94A80D0C0BE}"/>
+              </a:ext>
+            </a:extLst>
+          </p:cNvPr>
+          <p:cNvSpPr>
+            <a:spLocks noGrp="1"/>
+          </p:cNvSpPr>
+          <p:nvPr>
+            <p:ph type="sldNum" sz="quarter" idx="12"/>
+          </p:nvPr>
+        </p:nvSpPr>
+        <p:spPr/>
+        <p:txBody>
+          <a:bodyPr/>
+          <a:lstStyle/>
+          <a:p>
+            <a:pPr>
+              <a:defRPr/>
+            </a:pPr>
+            <a:fld id="{77EF9825-4C23-4085-A4E3-B5565466BD91}" type="slidenum">
+              <a:rPr lang="en-US" smtClean="0"/>
+              <a:pPr>
+                <a:defRPr/>
+              </a:pPr>
+              <a:t>21</a:t>
+            </a:fld>
+            <a:endParaRPr lang="en-US" dirty="0"/>
+          </a:p>
+        </p:txBody>
+      </p:sp>
+      <p:pic>
+        <p:nvPicPr>
+          <p:cNvPr id="6" name="Picture 5">
+            <a:extLst>
+              <a:ext uri="{FF2B5EF4-FFF2-40B4-BE49-F238E27FC236}">
+                <a16:creationId xmlns:a16="http://schemas.microsoft.com/office/drawing/2014/main" id="{1E71A1B8-2E3E-49E1-B463-AE731A48EFA3}"/>
+              </a:ext>
+            </a:extLst>
+          </p:cNvPr>
+          <p:cNvPicPr>
+            <a:picLocks noChangeAspect="1"/>
+          </p:cNvPicPr>
+          <p:nvPr/>
+        </p:nvPicPr>
+        <p:blipFill>
+          <a:blip r:embed="rId2">
+            <a:lum/>
+            <a:alphaModFix/>
+          </a:blip>
+          <a:srcRect/>
+          <a:stretch>
+            <a:fillRect/>
+          </a:stretch>
+        </p:blipFill>
+        <p:spPr>
+          <a:xfrm>
+            <a:off x="1485900" y="2860557"/>
+            <a:ext cx="6218100" cy="4445483"/>
+          </a:xfrm>
+          <a:prstGeom prst="rect">
+            <a:avLst/>
+          </a:prstGeom>
+          <a:noFill/>
+          <a:ln>
+            <a:noFill/>
+          </a:ln>
+        </p:spPr>
+      </p:pic>
+    </p:spTree>
+    <p:extLst>
+      <p:ext uri="{BB962C8B-B14F-4D97-AF65-F5344CB8AC3E}">
+        <p14:creationId xmlns:p14="http://schemas.microsoft.com/office/powerpoint/2010/main" val="1277946995"/>
+      </p:ext>
+    </p:extLst>
+  </p:cSld>
+  <p:clrMapOvr>
+    <a:masterClrMapping/>
+  </p:clrMapOvr>
+</p:sld>
+</file>
+
+<file path=ppt/slides/slide22.xml><?xml version="1.0" encoding="utf-8"?>
+<p:sld xmlns:a="http://schemas.openxmlformats.org/drawingml/2006/main" xmlns:r="http://schemas.openxmlformats.org/officeDocument/2006/relationships" xmlns:p="http://schemas.openxmlformats.org/presentationml/2006/main">
+  <p:cSld>
+    <p:spTree>
+      <p:nvGrpSpPr>
+        <p:cNvPr id="1" name=""/>
+        <p:cNvGrpSpPr/>
+        <p:nvPr/>
+      </p:nvGrpSpPr>
+      <p:grpSpPr>
+        <a:xfrm>
+          <a:off x="0" y="0"/>
+          <a:ext cx="0" cy="0"/>
+          <a:chOff x="0" y="0"/>
+          <a:chExt cx="0" cy="0"/>
+        </a:xfrm>
+      </p:grpSpPr>
+      <p:sp>
+        <p:nvSpPr>
+          <p:cNvPr id="2" name="Title 1">
+            <a:extLst>
+              <a:ext uri="{FF2B5EF4-FFF2-40B4-BE49-F238E27FC236}">
+                <a16:creationId xmlns:a16="http://schemas.microsoft.com/office/drawing/2014/main" id="{57AD2439-3DC5-455E-96EC-40AF7DE7A142}"/>
+              </a:ext>
+            </a:extLst>
+          </p:cNvPr>
+          <p:cNvSpPr>
+            <a:spLocks noGrp="1"/>
+          </p:cNvSpPr>
+          <p:nvPr>
+            <p:ph type="title"/>
+          </p:nvPr>
+        </p:nvSpPr>
+        <p:spPr/>
+        <p:txBody>
+          <a:bodyPr/>
+          <a:lstStyle/>
+          <a:p>
+            <a:r>
+              <a:rPr lang="en-US" dirty="0"/>
+              <a:t>SDLC Types</a:t>
+            </a:r>
+            <a:endParaRPr lang="en-CA" dirty="0"/>
+          </a:p>
+        </p:txBody>
+      </p:sp>
+      <p:sp>
+        <p:nvSpPr>
+          <p:cNvPr id="3" name="Content Placeholder 2">
+            <a:extLst>
+              <a:ext uri="{FF2B5EF4-FFF2-40B4-BE49-F238E27FC236}">
+                <a16:creationId xmlns:a16="http://schemas.microsoft.com/office/drawing/2014/main" id="{811F27C4-1BDC-47CB-8BC1-A74FC8C2F411}"/>
+              </a:ext>
+            </a:extLst>
+          </p:cNvPr>
+          <p:cNvSpPr>
+            <a:spLocks noGrp="1"/>
+          </p:cNvSpPr>
+          <p:nvPr>
+            <p:ph idx="1"/>
+          </p:nvPr>
+        </p:nvSpPr>
+        <p:spPr>
+          <a:xfrm>
+            <a:off x="234950" y="2853531"/>
+            <a:ext cx="8902700" cy="4906555"/>
+          </a:xfrm>
+        </p:spPr>
+        <p:txBody>
+          <a:bodyPr>
+            <a:normAutofit/>
+          </a:bodyPr>
+          <a:lstStyle/>
+          <a:p>
+            <a:r>
+              <a:rPr lang="en-US" dirty="0"/>
+              <a:t>Depends on how many of the requirements are knows at the start of the project</a:t>
+            </a:r>
+          </a:p>
+          <a:p>
+            <a:r>
+              <a:rPr lang="en-US" dirty="0"/>
+              <a:t>Two basic endpoints on a continuum:</a:t>
+            </a:r>
+          </a:p>
+          <a:p>
+            <a:pPr lvl="1"/>
+            <a:r>
+              <a:rPr lang="en-US" dirty="0"/>
+              <a:t>Predictive: We know all the requirements so we can predict exactly what the delivered product should be</a:t>
+            </a:r>
+          </a:p>
+          <a:p>
+            <a:pPr lvl="1"/>
+            <a:r>
+              <a:rPr lang="en-US" dirty="0"/>
+              <a:t>Adaptive: We only have partial requirements, so we deploy prototypes iteratively in order to explore unknown requirements</a:t>
+            </a:r>
+          </a:p>
+          <a:p>
+            <a:pPr lvl="1"/>
+            <a:r>
+              <a:rPr lang="en-US" dirty="0"/>
+              <a:t>Most projects will lie somewhere on the scale of adaptability</a:t>
+            </a:r>
+          </a:p>
+          <a:p>
+            <a:r>
+              <a:rPr lang="en-US" dirty="0"/>
+              <a:t>Predictive methods go through the engineering process once</a:t>
+            </a:r>
+          </a:p>
+          <a:p>
+            <a:r>
+              <a:rPr lang="en-US" dirty="0"/>
+              <a:t>Adaptive method go through the engineering process multiple times</a:t>
+            </a:r>
+          </a:p>
+          <a:p>
+            <a:pPr lvl="1"/>
+            <a:r>
+              <a:rPr lang="en-US" dirty="0"/>
+              <a:t>Each iteration adds an increment of development</a:t>
+            </a:r>
+          </a:p>
+        </p:txBody>
+      </p:sp>
+      <p:sp>
+        <p:nvSpPr>
+          <p:cNvPr id="4" name="Footer Placeholder 3">
+            <a:extLst>
+              <a:ext uri="{FF2B5EF4-FFF2-40B4-BE49-F238E27FC236}">
+                <a16:creationId xmlns:a16="http://schemas.microsoft.com/office/drawing/2014/main" id="{9E2D528B-75F6-4CD5-9735-BAE55A987C54}"/>
+              </a:ext>
+            </a:extLst>
+          </p:cNvPr>
+          <p:cNvSpPr>
+            <a:spLocks noGrp="1"/>
+          </p:cNvSpPr>
+          <p:nvPr>
+            <p:ph type="ftr" sz="quarter" idx="11"/>
+          </p:nvPr>
+        </p:nvSpPr>
+        <p:spPr/>
+        <p:txBody>
+          <a:bodyPr/>
+          <a:lstStyle/>
+          <a:p>
+            <a:pPr algn="l">
+              <a:defRPr/>
+            </a:pPr>
+            <a:r>
+              <a:rPr lang="en-US"/>
+              <a:t>Copyright © 2021 Elephant Scale. All rights reserved.</a:t>
+            </a:r>
+            <a:endParaRPr lang="en-US" dirty="0"/>
+          </a:p>
+        </p:txBody>
+      </p:sp>
+      <p:sp>
+        <p:nvSpPr>
+          <p:cNvPr id="5" name="Slide Number Placeholder 4">
+            <a:extLst>
+              <a:ext uri="{FF2B5EF4-FFF2-40B4-BE49-F238E27FC236}">
+                <a16:creationId xmlns:a16="http://schemas.microsoft.com/office/drawing/2014/main" id="{FFCB9888-D626-4880-A97C-D94A80D0C0BE}"/>
+              </a:ext>
+            </a:extLst>
+          </p:cNvPr>
+          <p:cNvSpPr>
+            <a:spLocks noGrp="1"/>
+          </p:cNvSpPr>
+          <p:nvPr>
+            <p:ph type="sldNum" sz="quarter" idx="12"/>
+          </p:nvPr>
+        </p:nvSpPr>
+        <p:spPr/>
+        <p:txBody>
+          <a:bodyPr/>
+          <a:lstStyle/>
+          <a:p>
+            <a:pPr>
+              <a:defRPr/>
+            </a:pPr>
+            <a:fld id="{77EF9825-4C23-4085-A4E3-B5565466BD91}" type="slidenum">
+              <a:rPr lang="en-US" smtClean="0"/>
+              <a:pPr>
+                <a:defRPr/>
+              </a:pPr>
+              <a:t>22</a:t>
+            </a:fld>
+            <a:endParaRPr lang="en-US" dirty="0"/>
+          </a:p>
+        </p:txBody>
+      </p:sp>
+      <p:pic>
+        <p:nvPicPr>
+          <p:cNvPr id="7" name="Picture 6">
+            <a:extLst>
+              <a:ext uri="{FF2B5EF4-FFF2-40B4-BE49-F238E27FC236}">
+                <a16:creationId xmlns:a16="http://schemas.microsoft.com/office/drawing/2014/main" id="{C0B0AC66-E178-4161-B5B1-51D8C8A3D0AB}"/>
+              </a:ext>
+            </a:extLst>
+          </p:cNvPr>
+          <p:cNvPicPr>
+            <a:picLocks noChangeAspect="1"/>
+          </p:cNvPicPr>
+          <p:nvPr/>
+        </p:nvPicPr>
+        <p:blipFill>
+          <a:blip r:embed="rId2">
+            <a:lum/>
+            <a:alphaModFix/>
+          </a:blip>
+          <a:srcRect/>
+          <a:stretch>
+            <a:fillRect/>
+          </a:stretch>
+        </p:blipFill>
+        <p:spPr>
+          <a:xfrm>
+            <a:off x="1158300" y="1172873"/>
+            <a:ext cx="7056000" cy="1407959"/>
+          </a:xfrm>
+          <a:prstGeom prst="rect">
+            <a:avLst/>
+          </a:prstGeom>
+          <a:noFill/>
+          <a:ln>
+            <a:noFill/>
+          </a:ln>
+        </p:spPr>
+      </p:pic>
+    </p:spTree>
+    <p:extLst>
+      <p:ext uri="{BB962C8B-B14F-4D97-AF65-F5344CB8AC3E}">
+        <p14:creationId xmlns:p14="http://schemas.microsoft.com/office/powerpoint/2010/main" val="3950537553"/>
+      </p:ext>
+    </p:extLst>
+  </p:cSld>
+  <p:clrMapOvr>
+    <a:masterClrMapping/>
+  </p:clrMapOvr>
+</p:sld>
+</file>
+
+<file path=ppt/slides/slide23.xml><?xml version="1.0" encoding="utf-8"?>
+<p:sld xmlns:a="http://schemas.openxmlformats.org/drawingml/2006/main" xmlns:r="http://schemas.openxmlformats.org/officeDocument/2006/relationships" xmlns:p="http://schemas.openxmlformats.org/presentationml/2006/main">
+  <p:cSld>
+    <p:spTree>
+      <p:nvGrpSpPr>
+        <p:cNvPr id="1" name=""/>
+        <p:cNvGrpSpPr/>
+        <p:nvPr/>
+      </p:nvGrpSpPr>
+      <p:grpSpPr>
+        <a:xfrm>
+          <a:off x="0" y="0"/>
+          <a:ext cx="0" cy="0"/>
+          <a:chOff x="0" y="0"/>
+          <a:chExt cx="0" cy="0"/>
+        </a:xfrm>
+      </p:grpSpPr>
+      <p:sp>
+        <p:nvSpPr>
+          <p:cNvPr id="2" name="Title 1">
+            <a:extLst>
+              <a:ext uri="{FF2B5EF4-FFF2-40B4-BE49-F238E27FC236}">
+                <a16:creationId xmlns:a16="http://schemas.microsoft.com/office/drawing/2014/main" id="{46705C13-BC2B-4BBE-B4DA-37C787502033}"/>
+              </a:ext>
+            </a:extLst>
+          </p:cNvPr>
+          <p:cNvSpPr>
+            <a:spLocks noGrp="1"/>
+          </p:cNvSpPr>
+          <p:nvPr>
+            <p:ph type="title"/>
+          </p:nvPr>
+        </p:nvSpPr>
+        <p:spPr/>
+        <p:txBody>
+          <a:bodyPr>
+            <a:normAutofit/>
+          </a:bodyPr>
+          <a:lstStyle/>
+          <a:p>
+            <a:r>
+              <a:rPr lang="en-CA" dirty="0"/>
+              <a:t>Predictive Processes</a:t>
+            </a:r>
+          </a:p>
+        </p:txBody>
+      </p:sp>
+      <p:sp>
+        <p:nvSpPr>
+          <p:cNvPr id="3" name="Content Placeholder 2">
+            <a:extLst>
+              <a:ext uri="{FF2B5EF4-FFF2-40B4-BE49-F238E27FC236}">
+                <a16:creationId xmlns:a16="http://schemas.microsoft.com/office/drawing/2014/main" id="{ABB19356-26FC-41D9-961A-86131CA09FE2}"/>
+              </a:ext>
+            </a:extLst>
+          </p:cNvPr>
+          <p:cNvSpPr>
+            <a:spLocks noGrp="1"/>
+          </p:cNvSpPr>
+          <p:nvPr>
+            <p:ph idx="1"/>
+          </p:nvPr>
+        </p:nvSpPr>
+        <p:spPr/>
+        <p:txBody>
+          <a:bodyPr>
+            <a:normAutofit/>
+          </a:bodyPr>
+          <a:lstStyle/>
+          <a:p>
+            <a:r>
+              <a:rPr lang="en-US" dirty="0"/>
+              <a:t>All the requirements are known at the project start 	</a:t>
+            </a:r>
+          </a:p>
+          <a:p>
+            <a:pPr lvl="1"/>
+            <a:r>
+              <a:rPr lang="en-US" dirty="0"/>
+              <a:t>Characteristic of projects that have high amounts of risk</a:t>
+            </a:r>
+          </a:p>
+          <a:p>
+            <a:pPr lvl="1"/>
+            <a:r>
+              <a:rPr lang="en-US" dirty="0"/>
+              <a:t>Usually implemented as a waterfall SDLC</a:t>
+            </a:r>
+          </a:p>
+          <a:p>
+            <a:r>
+              <a:rPr lang="en-US" dirty="0"/>
+              <a:t>The final result or target can be accurately specified</a:t>
+            </a:r>
+          </a:p>
+          <a:p>
+            <a:pPr lvl="1"/>
+            <a:r>
+              <a:rPr lang="en-US" dirty="0"/>
+              <a:t>Very important for mission critical systems like software that runs a nuclear reactor cooling system or a heart pacemaker</a:t>
+            </a:r>
+          </a:p>
+          <a:p>
+            <a:r>
+              <a:rPr lang="en-US" dirty="0"/>
+              <a:t>Often not suited for software that users interact with</a:t>
+            </a:r>
+          </a:p>
+          <a:p>
+            <a:r>
+              <a:rPr lang="en-US" dirty="0"/>
+              <a:t>Predictive SLDCs start to become very inefficient and ineffective when requirements change quickly or are not completely known</a:t>
+            </a:r>
+          </a:p>
+          <a:p>
+            <a:pPr lvl="1"/>
+            <a:r>
+              <a:rPr lang="en-US" dirty="0"/>
+              <a:t>Especially true of new or innovative software	</a:t>
+            </a:r>
+          </a:p>
+          <a:p>
+            <a:endParaRPr lang="en-CA" dirty="0"/>
+          </a:p>
+        </p:txBody>
+      </p:sp>
+      <p:sp>
+        <p:nvSpPr>
+          <p:cNvPr id="4" name="Footer Placeholder 3">
+            <a:extLst>
+              <a:ext uri="{FF2B5EF4-FFF2-40B4-BE49-F238E27FC236}">
+                <a16:creationId xmlns:a16="http://schemas.microsoft.com/office/drawing/2014/main" id="{CCCFC134-C075-4928-9BB3-D7E729575284}"/>
+              </a:ext>
+            </a:extLst>
+          </p:cNvPr>
+          <p:cNvSpPr>
+            <a:spLocks noGrp="1"/>
+          </p:cNvSpPr>
+          <p:nvPr>
+            <p:ph type="ftr" sz="quarter" idx="11"/>
+          </p:nvPr>
+        </p:nvSpPr>
+        <p:spPr/>
+        <p:txBody>
+          <a:bodyPr/>
+          <a:lstStyle/>
+          <a:p>
+            <a:pPr algn="l">
+              <a:defRPr/>
+            </a:pPr>
+            <a:r>
+              <a:rPr lang="en-US"/>
+              <a:t>Copyright © 2021 Elephant Scale. All rights reserved.</a:t>
+            </a:r>
+            <a:endParaRPr lang="en-US" dirty="0"/>
+          </a:p>
+        </p:txBody>
+      </p:sp>
+      <p:sp>
+        <p:nvSpPr>
+          <p:cNvPr id="5" name="Slide Number Placeholder 4">
+            <a:extLst>
+              <a:ext uri="{FF2B5EF4-FFF2-40B4-BE49-F238E27FC236}">
+                <a16:creationId xmlns:a16="http://schemas.microsoft.com/office/drawing/2014/main" id="{1D2FDBB0-5230-4DCD-BA99-EB9483BBB69C}"/>
+              </a:ext>
+            </a:extLst>
+          </p:cNvPr>
+          <p:cNvSpPr>
+            <a:spLocks noGrp="1"/>
+          </p:cNvSpPr>
+          <p:nvPr>
+            <p:ph type="sldNum" sz="quarter" idx="12"/>
+          </p:nvPr>
+        </p:nvSpPr>
+        <p:spPr/>
+        <p:txBody>
+          <a:bodyPr/>
+          <a:lstStyle/>
+          <a:p>
+            <a:pPr>
+              <a:defRPr/>
+            </a:pPr>
+            <a:fld id="{77EF9825-4C23-4085-A4E3-B5565466BD91}" type="slidenum">
+              <a:rPr lang="en-US" smtClean="0"/>
+              <a:pPr>
+                <a:defRPr/>
+              </a:pPr>
+              <a:t>23</a:t>
+            </a:fld>
+            <a:endParaRPr lang="en-US" dirty="0"/>
+          </a:p>
+        </p:txBody>
+      </p:sp>
+    </p:spTree>
+    <p:extLst>
+      <p:ext uri="{BB962C8B-B14F-4D97-AF65-F5344CB8AC3E}">
+        <p14:creationId xmlns:p14="http://schemas.microsoft.com/office/powerpoint/2010/main" val="1802139617"/>
+      </p:ext>
+    </p:extLst>
+  </p:cSld>
+  <p:clrMapOvr>
+    <a:masterClrMapping/>
+  </p:clrMapOvr>
+</p:sld>
+</file>
+
+<file path=ppt/slides/slide24.xml><?xml version="1.0" encoding="utf-8"?>
+<p:sld xmlns:a="http://schemas.openxmlformats.org/drawingml/2006/main" xmlns:r="http://schemas.openxmlformats.org/officeDocument/2006/relationships" xmlns:p="http://schemas.openxmlformats.org/presentationml/2006/main">
+  <p:cSld>
+    <p:spTree>
+      <p:nvGrpSpPr>
+        <p:cNvPr id="1" name=""/>
+        <p:cNvGrpSpPr/>
+        <p:nvPr/>
+      </p:nvGrpSpPr>
+      <p:grpSpPr>
+        <a:xfrm>
+          <a:off x="0" y="0"/>
+          <a:ext cx="0" cy="0"/>
+          <a:chOff x="0" y="0"/>
+          <a:chExt cx="0" cy="0"/>
+        </a:xfrm>
+      </p:grpSpPr>
+      <p:sp>
+        <p:nvSpPr>
+          <p:cNvPr id="2" name="Title 1">
+            <a:extLst>
+              <a:ext uri="{FF2B5EF4-FFF2-40B4-BE49-F238E27FC236}">
+                <a16:creationId xmlns:a16="http://schemas.microsoft.com/office/drawing/2014/main" id="{46705C13-BC2B-4BBE-B4DA-37C787502033}"/>
+              </a:ext>
+            </a:extLst>
+          </p:cNvPr>
+          <p:cNvSpPr>
+            <a:spLocks noGrp="1"/>
+          </p:cNvSpPr>
+          <p:nvPr>
+            <p:ph type="title"/>
+          </p:nvPr>
+        </p:nvSpPr>
+        <p:spPr/>
+        <p:txBody>
+          <a:bodyPr>
+            <a:normAutofit/>
+          </a:bodyPr>
+          <a:lstStyle/>
+          <a:p>
+            <a:r>
+              <a:rPr lang="en-CA" dirty="0"/>
+              <a:t>Adaptive Processes</a:t>
+            </a:r>
+          </a:p>
+        </p:txBody>
+      </p:sp>
+      <p:sp>
+        <p:nvSpPr>
+          <p:cNvPr id="3" name="Content Placeholder 2">
+            <a:extLst>
+              <a:ext uri="{FF2B5EF4-FFF2-40B4-BE49-F238E27FC236}">
+                <a16:creationId xmlns:a16="http://schemas.microsoft.com/office/drawing/2014/main" id="{ABB19356-26FC-41D9-961A-86131CA09FE2}"/>
+              </a:ext>
+            </a:extLst>
+          </p:cNvPr>
+          <p:cNvSpPr>
+            <a:spLocks noGrp="1"/>
+          </p:cNvSpPr>
+          <p:nvPr>
+            <p:ph idx="1"/>
+          </p:nvPr>
+        </p:nvSpPr>
+        <p:spPr/>
+        <p:txBody>
+          <a:bodyPr>
+            <a:normAutofit/>
+          </a:bodyPr>
+          <a:lstStyle/>
+          <a:p>
+            <a:r>
+              <a:rPr lang="en-US" dirty="0"/>
+              <a:t>Many of the requirements are not known at the project start</a:t>
+            </a:r>
+          </a:p>
+          <a:p>
+            <a:r>
+              <a:rPr lang="en-US" dirty="0"/>
+              <a:t>Very often we are focused on solving a problem but the nature of the solution is unknown</a:t>
+            </a:r>
+          </a:p>
+          <a:p>
+            <a:pPr lvl="1"/>
+            <a:r>
+              <a:rPr lang="en-US" dirty="0"/>
+              <a:t>We must take a trial and error approach</a:t>
+            </a:r>
+          </a:p>
+          <a:p>
+            <a:r>
+              <a:rPr lang="en-US" dirty="0"/>
+              <a:t>We may be deploying new technology where requirements are not yet known</a:t>
+            </a:r>
+          </a:p>
+          <a:p>
+            <a:r>
+              <a:rPr lang="en-US" dirty="0"/>
+              <a:t>Stakeholders have no idea what their requirements would be and often need to have a prototype to play with to start to identify their requirements</a:t>
+            </a:r>
+          </a:p>
+          <a:p>
+            <a:r>
+              <a:rPr lang="en-US" dirty="0"/>
+              <a:t>Most commonly needed when requirements are fluid (like with user	interfaces or automating interactions</a:t>
+            </a:r>
+          </a:p>
+          <a:p>
+            <a:endParaRPr lang="en-CA" dirty="0"/>
+          </a:p>
+        </p:txBody>
+      </p:sp>
+      <p:sp>
+        <p:nvSpPr>
+          <p:cNvPr id="4" name="Footer Placeholder 3">
+            <a:extLst>
+              <a:ext uri="{FF2B5EF4-FFF2-40B4-BE49-F238E27FC236}">
+                <a16:creationId xmlns:a16="http://schemas.microsoft.com/office/drawing/2014/main" id="{CCCFC134-C075-4928-9BB3-D7E729575284}"/>
+              </a:ext>
+            </a:extLst>
+          </p:cNvPr>
+          <p:cNvSpPr>
+            <a:spLocks noGrp="1"/>
+          </p:cNvSpPr>
+          <p:nvPr>
+            <p:ph type="ftr" sz="quarter" idx="11"/>
+          </p:nvPr>
+        </p:nvSpPr>
+        <p:spPr/>
+        <p:txBody>
+          <a:bodyPr/>
+          <a:lstStyle/>
+          <a:p>
+            <a:pPr algn="l">
+              <a:defRPr/>
+            </a:pPr>
+            <a:r>
+              <a:rPr lang="en-US"/>
+              <a:t>Copyright © 2021 Elephant Scale. All rights reserved.</a:t>
+            </a:r>
+            <a:endParaRPr lang="en-US" dirty="0"/>
+          </a:p>
+        </p:txBody>
+      </p:sp>
+      <p:sp>
+        <p:nvSpPr>
+          <p:cNvPr id="5" name="Slide Number Placeholder 4">
+            <a:extLst>
+              <a:ext uri="{FF2B5EF4-FFF2-40B4-BE49-F238E27FC236}">
+                <a16:creationId xmlns:a16="http://schemas.microsoft.com/office/drawing/2014/main" id="{1D2FDBB0-5230-4DCD-BA99-EB9483BBB69C}"/>
+              </a:ext>
+            </a:extLst>
+          </p:cNvPr>
+          <p:cNvSpPr>
+            <a:spLocks noGrp="1"/>
+          </p:cNvSpPr>
+          <p:nvPr>
+            <p:ph type="sldNum" sz="quarter" idx="12"/>
+          </p:nvPr>
+        </p:nvSpPr>
+        <p:spPr/>
+        <p:txBody>
+          <a:bodyPr/>
+          <a:lstStyle/>
+          <a:p>
+            <a:pPr>
+              <a:defRPr/>
+            </a:pPr>
+            <a:fld id="{77EF9825-4C23-4085-A4E3-B5565466BD91}" type="slidenum">
+              <a:rPr lang="en-US" smtClean="0"/>
+              <a:pPr>
+                <a:defRPr/>
+              </a:pPr>
+              <a:t>24</a:t>
+            </a:fld>
+            <a:endParaRPr lang="en-US" dirty="0"/>
+          </a:p>
+        </p:txBody>
+      </p:sp>
+    </p:spTree>
+    <p:extLst>
+      <p:ext uri="{BB962C8B-B14F-4D97-AF65-F5344CB8AC3E}">
+        <p14:creationId xmlns:p14="http://schemas.microsoft.com/office/powerpoint/2010/main" val="2318724607"/>
+      </p:ext>
+    </p:extLst>
+  </p:cSld>
+  <p:clrMapOvr>
+    <a:masterClrMapping/>
+  </p:clrMapOvr>
+</p:sld>
+</file>
+
+<file path=ppt/slides/slide25.xml><?xml version="1.0" encoding="utf-8"?>
+<p:sld xmlns:a="http://schemas.openxmlformats.org/drawingml/2006/main" xmlns:r="http://schemas.openxmlformats.org/officeDocument/2006/relationships" xmlns:p="http://schemas.openxmlformats.org/presentationml/2006/main">
+  <p:cSld>
+    <p:spTree>
+      <p:nvGrpSpPr>
+        <p:cNvPr id="1" name=""/>
+        <p:cNvGrpSpPr/>
+        <p:nvPr/>
+      </p:nvGrpSpPr>
+      <p:grpSpPr>
+        <a:xfrm>
+          <a:off x="0" y="0"/>
+          <a:ext cx="0" cy="0"/>
+          <a:chOff x="0" y="0"/>
+          <a:chExt cx="0" cy="0"/>
+        </a:xfrm>
+      </p:grpSpPr>
+      <p:sp>
+        <p:nvSpPr>
+          <p:cNvPr id="2" name="Title 1">
+            <a:extLst>
+              <a:ext uri="{FF2B5EF4-FFF2-40B4-BE49-F238E27FC236}">
+                <a16:creationId xmlns:a16="http://schemas.microsoft.com/office/drawing/2014/main" id="{46705C13-BC2B-4BBE-B4DA-37C787502033}"/>
+              </a:ext>
+            </a:extLst>
+          </p:cNvPr>
+          <p:cNvSpPr>
+            <a:spLocks noGrp="1"/>
+          </p:cNvSpPr>
+          <p:nvPr>
+            <p:ph type="title"/>
+          </p:nvPr>
+        </p:nvSpPr>
+        <p:spPr/>
+        <p:txBody>
+          <a:bodyPr>
+            <a:normAutofit/>
+          </a:bodyPr>
+          <a:lstStyle/>
+          <a:p>
+            <a:r>
+              <a:rPr lang="en-CA" dirty="0"/>
+              <a:t>Iterative Processes</a:t>
+            </a:r>
+          </a:p>
+        </p:txBody>
+      </p:sp>
+      <p:sp>
+        <p:nvSpPr>
+          <p:cNvPr id="3" name="Content Placeholder 2">
+            <a:extLst>
+              <a:ext uri="{FF2B5EF4-FFF2-40B4-BE49-F238E27FC236}">
+                <a16:creationId xmlns:a16="http://schemas.microsoft.com/office/drawing/2014/main" id="{ABB19356-26FC-41D9-961A-86131CA09FE2}"/>
+              </a:ext>
+            </a:extLst>
+          </p:cNvPr>
+          <p:cNvSpPr>
+            <a:spLocks noGrp="1"/>
+          </p:cNvSpPr>
+          <p:nvPr>
+            <p:ph idx="1"/>
+          </p:nvPr>
+        </p:nvSpPr>
+        <p:spPr/>
+        <p:txBody>
+          <a:bodyPr>
+            <a:normAutofit/>
+          </a:bodyPr>
+          <a:lstStyle/>
+          <a:p>
+            <a:r>
+              <a:rPr lang="en-US" dirty="0"/>
+              <a:t>Most of the requirements are known at the project start </a:t>
+            </a:r>
+          </a:p>
+          <a:p>
+            <a:r>
+              <a:rPr lang="en-US" dirty="0"/>
+              <a:t>Some new or some changes to requirements are anticipated</a:t>
+            </a:r>
+          </a:p>
+          <a:p>
+            <a:r>
+              <a:rPr lang="en-US" dirty="0"/>
+              <a:t>Process works in iterations which are mini-projects</a:t>
+            </a:r>
+          </a:p>
+          <a:p>
+            <a:r>
+              <a:rPr lang="en-US" dirty="0"/>
+              <a:t>At the end of each iteration, there is a re-evaluation of the requirements, specification and design</a:t>
+            </a:r>
+          </a:p>
+          <a:p>
+            <a:r>
+              <a:rPr lang="en-US" dirty="0"/>
+              <a:t>Tends to be used a lot in developing cyber-physical systems</a:t>
+            </a:r>
+          </a:p>
+          <a:p>
+            <a:r>
+              <a:rPr lang="en-US" dirty="0"/>
+              <a:t>Often used instead of a predictive process when risk is important but not all the requirements are available</a:t>
+            </a:r>
+          </a:p>
+          <a:p>
+            <a:endParaRPr lang="en-US" dirty="0"/>
+          </a:p>
+          <a:p>
+            <a:endParaRPr lang="en-CA" dirty="0"/>
+          </a:p>
+        </p:txBody>
+      </p:sp>
+      <p:sp>
+        <p:nvSpPr>
+          <p:cNvPr id="4" name="Footer Placeholder 3">
+            <a:extLst>
+              <a:ext uri="{FF2B5EF4-FFF2-40B4-BE49-F238E27FC236}">
+                <a16:creationId xmlns:a16="http://schemas.microsoft.com/office/drawing/2014/main" id="{CCCFC134-C075-4928-9BB3-D7E729575284}"/>
+              </a:ext>
+            </a:extLst>
+          </p:cNvPr>
+          <p:cNvSpPr>
+            <a:spLocks noGrp="1"/>
+          </p:cNvSpPr>
+          <p:nvPr>
+            <p:ph type="ftr" sz="quarter" idx="11"/>
+          </p:nvPr>
+        </p:nvSpPr>
+        <p:spPr/>
+        <p:txBody>
+          <a:bodyPr/>
+          <a:lstStyle/>
+          <a:p>
+            <a:pPr algn="l">
+              <a:defRPr/>
+            </a:pPr>
+            <a:r>
+              <a:rPr lang="en-US"/>
+              <a:t>Copyright © 2021 Elephant Scale. All rights reserved.</a:t>
+            </a:r>
+            <a:endParaRPr lang="en-US" dirty="0"/>
+          </a:p>
+        </p:txBody>
+      </p:sp>
+      <p:sp>
+        <p:nvSpPr>
+          <p:cNvPr id="5" name="Slide Number Placeholder 4">
+            <a:extLst>
+              <a:ext uri="{FF2B5EF4-FFF2-40B4-BE49-F238E27FC236}">
+                <a16:creationId xmlns:a16="http://schemas.microsoft.com/office/drawing/2014/main" id="{1D2FDBB0-5230-4DCD-BA99-EB9483BBB69C}"/>
+              </a:ext>
+            </a:extLst>
+          </p:cNvPr>
+          <p:cNvSpPr>
+            <a:spLocks noGrp="1"/>
+          </p:cNvSpPr>
+          <p:nvPr>
+            <p:ph type="sldNum" sz="quarter" idx="12"/>
+          </p:nvPr>
+        </p:nvSpPr>
+        <p:spPr/>
+        <p:txBody>
+          <a:bodyPr/>
+          <a:lstStyle/>
+          <a:p>
+            <a:pPr>
+              <a:defRPr/>
+            </a:pPr>
+            <a:fld id="{77EF9825-4C23-4085-A4E3-B5565466BD91}" type="slidenum">
+              <a:rPr lang="en-US" smtClean="0"/>
+              <a:pPr>
+                <a:defRPr/>
+              </a:pPr>
+              <a:t>25</a:t>
+            </a:fld>
+            <a:endParaRPr lang="en-US" dirty="0"/>
+          </a:p>
+        </p:txBody>
+      </p:sp>
+    </p:spTree>
+    <p:extLst>
+      <p:ext uri="{BB962C8B-B14F-4D97-AF65-F5344CB8AC3E}">
+        <p14:creationId xmlns:p14="http://schemas.microsoft.com/office/powerpoint/2010/main" val="609853882"/>
+      </p:ext>
+    </p:extLst>
+  </p:cSld>
+  <p:clrMapOvr>
+    <a:masterClrMapping/>
+  </p:clrMapOvr>
+</p:sld>
+</file>
+
+<file path=ppt/slides/slide26.xml><?xml version="1.0" encoding="utf-8"?>
+<p:sld xmlns:a="http://schemas.openxmlformats.org/drawingml/2006/main" xmlns:r="http://schemas.openxmlformats.org/officeDocument/2006/relationships" xmlns:p="http://schemas.openxmlformats.org/presentationml/2006/main">
+  <p:cSld>
+    <p:spTree>
+      <p:nvGrpSpPr>
+        <p:cNvPr id="1" name=""/>
+        <p:cNvGrpSpPr/>
+        <p:nvPr/>
+      </p:nvGrpSpPr>
+      <p:grpSpPr>
+        <a:xfrm>
+          <a:off x="0" y="0"/>
+          <a:ext cx="0" cy="0"/>
+          <a:chOff x="0" y="0"/>
+          <a:chExt cx="0" cy="0"/>
+        </a:xfrm>
+      </p:grpSpPr>
+      <p:sp>
+        <p:nvSpPr>
+          <p:cNvPr id="2" name="Title 1">
+            <a:extLst>
+              <a:ext uri="{FF2B5EF4-FFF2-40B4-BE49-F238E27FC236}">
+                <a16:creationId xmlns:a16="http://schemas.microsoft.com/office/drawing/2014/main" id="{46705C13-BC2B-4BBE-B4DA-37C787502033}"/>
+              </a:ext>
+            </a:extLst>
+          </p:cNvPr>
+          <p:cNvSpPr>
+            <a:spLocks noGrp="1"/>
+          </p:cNvSpPr>
+          <p:nvPr>
+            <p:ph type="title"/>
+          </p:nvPr>
+        </p:nvSpPr>
+        <p:spPr/>
+        <p:txBody>
+          <a:bodyPr>
+            <a:normAutofit/>
+          </a:bodyPr>
+          <a:lstStyle/>
+          <a:p>
+            <a:r>
+              <a:rPr lang="en-CA" dirty="0"/>
+              <a:t>Non-Agile Adaptive SDLCs</a:t>
+            </a:r>
+          </a:p>
+        </p:txBody>
+      </p:sp>
+      <p:sp>
+        <p:nvSpPr>
+          <p:cNvPr id="4" name="Footer Placeholder 3">
+            <a:extLst>
+              <a:ext uri="{FF2B5EF4-FFF2-40B4-BE49-F238E27FC236}">
+                <a16:creationId xmlns:a16="http://schemas.microsoft.com/office/drawing/2014/main" id="{CCCFC134-C075-4928-9BB3-D7E729575284}"/>
+              </a:ext>
+            </a:extLst>
+          </p:cNvPr>
+          <p:cNvSpPr>
+            <a:spLocks noGrp="1"/>
+          </p:cNvSpPr>
+          <p:nvPr>
+            <p:ph type="ftr" sz="quarter" idx="11"/>
+          </p:nvPr>
+        </p:nvSpPr>
+        <p:spPr/>
+        <p:txBody>
+          <a:bodyPr/>
+          <a:lstStyle/>
+          <a:p>
+            <a:pPr algn="l">
+              <a:defRPr/>
+            </a:pPr>
+            <a:r>
+              <a:rPr lang="en-US"/>
+              <a:t>Copyright © 2021 Elephant Scale. All rights reserved.</a:t>
+            </a:r>
+            <a:endParaRPr lang="en-US" dirty="0"/>
+          </a:p>
+        </p:txBody>
+      </p:sp>
+      <p:sp>
+        <p:nvSpPr>
+          <p:cNvPr id="5" name="Slide Number Placeholder 4">
+            <a:extLst>
+              <a:ext uri="{FF2B5EF4-FFF2-40B4-BE49-F238E27FC236}">
+                <a16:creationId xmlns:a16="http://schemas.microsoft.com/office/drawing/2014/main" id="{1D2FDBB0-5230-4DCD-BA99-EB9483BBB69C}"/>
+              </a:ext>
+            </a:extLst>
+          </p:cNvPr>
+          <p:cNvSpPr>
+            <a:spLocks noGrp="1"/>
+          </p:cNvSpPr>
+          <p:nvPr>
+            <p:ph type="sldNum" sz="quarter" idx="12"/>
+          </p:nvPr>
+        </p:nvSpPr>
+        <p:spPr/>
+        <p:txBody>
+          <a:bodyPr/>
+          <a:lstStyle/>
+          <a:p>
+            <a:pPr>
+              <a:defRPr/>
+            </a:pPr>
+            <a:fld id="{77EF9825-4C23-4085-A4E3-B5565466BD91}" type="slidenum">
+              <a:rPr lang="en-US" smtClean="0"/>
+              <a:pPr>
+                <a:defRPr/>
+              </a:pPr>
+              <a:t>26</a:t>
+            </a:fld>
+            <a:endParaRPr lang="en-US" dirty="0"/>
+          </a:p>
+        </p:txBody>
+      </p:sp>
+      <p:pic>
+        <p:nvPicPr>
+          <p:cNvPr id="6" name="Picture 5">
+            <a:extLst>
+              <a:ext uri="{FF2B5EF4-FFF2-40B4-BE49-F238E27FC236}">
+                <a16:creationId xmlns:a16="http://schemas.microsoft.com/office/drawing/2014/main" id="{DCC484AB-24A8-4445-A1B8-F3CAF71E6AFA}"/>
+              </a:ext>
+            </a:extLst>
+          </p:cNvPr>
+          <p:cNvPicPr>
+            <a:picLocks noChangeAspect="1"/>
+          </p:cNvPicPr>
+          <p:nvPr/>
+        </p:nvPicPr>
+        <p:blipFill>
+          <a:blip r:embed="rId2"/>
+          <a:stretch>
+            <a:fillRect/>
+          </a:stretch>
+        </p:blipFill>
+        <p:spPr>
+          <a:xfrm>
+            <a:off x="952500" y="2291514"/>
+            <a:ext cx="3592936" cy="3429000"/>
+          </a:xfrm>
+          <a:prstGeom prst="rect">
+            <a:avLst/>
+          </a:prstGeom>
+        </p:spPr>
+      </p:pic>
+      <p:sp>
+        <p:nvSpPr>
+          <p:cNvPr id="9" name="TextBox 8">
+            <a:extLst>
+              <a:ext uri="{FF2B5EF4-FFF2-40B4-BE49-F238E27FC236}">
+                <a16:creationId xmlns:a16="http://schemas.microsoft.com/office/drawing/2014/main" id="{033D9755-6A06-4DDF-A4E3-645C67251FE8}"/>
+              </a:ext>
+            </a:extLst>
+          </p:cNvPr>
+          <p:cNvSpPr txBox="1"/>
+          <p:nvPr/>
+        </p:nvSpPr>
+        <p:spPr>
+          <a:xfrm>
+            <a:off x="5038725" y="1481931"/>
+            <a:ext cx="3914775" cy="5355312"/>
+          </a:xfrm>
+          <a:prstGeom prst="rect">
+            <a:avLst/>
+          </a:prstGeom>
+          <a:noFill/>
+        </p:spPr>
+        <p:txBody>
+          <a:bodyPr wrap="square" rtlCol="0">
+            <a:spAutoFit/>
+          </a:bodyPr>
+          <a:lstStyle/>
+          <a:p>
+            <a:r>
+              <a:rPr lang="en-US" sz="1800" i="1" dirty="0">
+                <a:solidFill>
+                  <a:schemeClr val="bg2"/>
+                </a:solidFill>
+              </a:rPr>
+              <a:t>Barry Boehm’s Spiral methodology from 1986 defined a series of iterations with the objective of producing prototypes which were used to provide inputs into the subsequent iterations.  </a:t>
+            </a:r>
+          </a:p>
+          <a:p>
+            <a:endParaRPr lang="en-US" sz="1800" i="1" dirty="0">
+              <a:solidFill>
+                <a:schemeClr val="bg2"/>
+              </a:solidFill>
+            </a:endParaRPr>
+          </a:p>
+          <a:p>
+            <a:r>
+              <a:rPr lang="en-US" sz="1800" i="1" dirty="0">
+                <a:solidFill>
+                  <a:schemeClr val="bg2"/>
+                </a:solidFill>
+              </a:rPr>
+              <a:t>Another  adaptive methodology is James Martin’s Rapid Application Development (RAD) developed in the 1980s at IBM.  </a:t>
+            </a:r>
+          </a:p>
+          <a:p>
+            <a:endParaRPr lang="en-US" sz="1800" i="1" dirty="0">
+              <a:solidFill>
+                <a:schemeClr val="bg2"/>
+              </a:solidFill>
+            </a:endParaRPr>
+          </a:p>
+          <a:p>
+            <a:r>
+              <a:rPr lang="en-US" sz="1800" i="1" dirty="0">
+                <a:solidFill>
+                  <a:schemeClr val="bg2"/>
+                </a:solidFill>
+              </a:rPr>
+              <a:t>Both SDLCs was built around the idea that for some sorts of development, like working with user interfaces, the requirements are too fluid for a predictive approach.</a:t>
+            </a:r>
+          </a:p>
+          <a:p>
+            <a:endParaRPr lang="en-US" sz="1800" i="1" dirty="0">
+              <a:solidFill>
+                <a:schemeClr val="bg2"/>
+              </a:solidFill>
+            </a:endParaRPr>
+          </a:p>
+          <a:p>
+            <a:r>
+              <a:rPr lang="en-US" sz="1800" i="1" dirty="0">
+                <a:solidFill>
+                  <a:schemeClr val="bg2"/>
+                </a:solidFill>
+              </a:rPr>
+              <a:t>The RAD approach, like the Spiral methodology, </a:t>
+            </a:r>
+            <a:r>
+              <a:rPr lang="en-US" sz="1800" i="1" dirty="0" err="1">
+                <a:solidFill>
+                  <a:schemeClr val="bg2"/>
+                </a:solidFill>
+              </a:rPr>
+              <a:t>centred</a:t>
+            </a:r>
+            <a:r>
+              <a:rPr lang="en-US" sz="1800" i="1" dirty="0">
+                <a:solidFill>
+                  <a:schemeClr val="bg2"/>
+                </a:solidFill>
+              </a:rPr>
+              <a:t> around getting a prototype into the hands of the users to start generating feedback that would be used to continuously develop the </a:t>
+            </a:r>
+            <a:endParaRPr lang="en-CA" sz="1800" i="1" dirty="0">
+              <a:solidFill>
+                <a:schemeClr val="bg2"/>
+              </a:solidFill>
+            </a:endParaRPr>
+          </a:p>
+        </p:txBody>
+      </p:sp>
+    </p:spTree>
+    <p:extLst>
+      <p:ext uri="{BB962C8B-B14F-4D97-AF65-F5344CB8AC3E}">
+        <p14:creationId xmlns:p14="http://schemas.microsoft.com/office/powerpoint/2010/main" val="3042666828"/>
+      </p:ext>
+    </p:extLst>
+  </p:cSld>
+  <p:clrMapOvr>
+    <a:masterClrMapping/>
+  </p:clrMapOvr>
+</p:sld>
+</file>
+
+<file path=ppt/slides/slide27.xml><?xml version="1.0" encoding="utf-8"?>
+<p:sld xmlns:a="http://schemas.openxmlformats.org/drawingml/2006/main" xmlns:r="http://schemas.openxmlformats.org/officeDocument/2006/relationships" xmlns:p="http://schemas.openxmlformats.org/presentationml/2006/main">
+  <p:cSld>
+    <p:spTree>
+      <p:nvGrpSpPr>
+        <p:cNvPr id="1" name=""/>
+        <p:cNvGrpSpPr/>
+        <p:nvPr/>
+      </p:nvGrpSpPr>
+      <p:grpSpPr>
+        <a:xfrm>
+          <a:off x="0" y="0"/>
+          <a:ext cx="0" cy="0"/>
+          <a:chOff x="0" y="0"/>
+          <a:chExt cx="0" cy="0"/>
+        </a:xfrm>
+      </p:grpSpPr>
+      <p:sp>
+        <p:nvSpPr>
+          <p:cNvPr id="2" name="Title 1">
+            <a:extLst>
+              <a:ext uri="{FF2B5EF4-FFF2-40B4-BE49-F238E27FC236}">
+                <a16:creationId xmlns:a16="http://schemas.microsoft.com/office/drawing/2014/main" id="{6CEEB8EA-3701-4F78-9339-875BC02F3933}"/>
+              </a:ext>
+            </a:extLst>
+          </p:cNvPr>
+          <p:cNvSpPr>
+            <a:spLocks noGrp="1"/>
+          </p:cNvSpPr>
+          <p:nvPr>
+            <p:ph type="title"/>
+          </p:nvPr>
+        </p:nvSpPr>
+        <p:spPr/>
+        <p:txBody>
+          <a:bodyPr/>
+          <a:lstStyle/>
+          <a:p>
+            <a:r>
+              <a:rPr lang="en-US" dirty="0"/>
+              <a:t>The Specification</a:t>
+            </a:r>
+            <a:endParaRPr lang="en-CA" dirty="0"/>
+          </a:p>
+        </p:txBody>
+      </p:sp>
+      <p:sp>
+        <p:nvSpPr>
+          <p:cNvPr id="3" name="Content Placeholder 2">
+            <a:extLst>
+              <a:ext uri="{FF2B5EF4-FFF2-40B4-BE49-F238E27FC236}">
+                <a16:creationId xmlns:a16="http://schemas.microsoft.com/office/drawing/2014/main" id="{31F83A15-A483-44CE-92F4-56BFDA2F1A56}"/>
+              </a:ext>
+            </a:extLst>
+          </p:cNvPr>
+          <p:cNvSpPr>
+            <a:spLocks noGrp="1"/>
+          </p:cNvSpPr>
+          <p:nvPr>
+            <p:ph idx="1"/>
+          </p:nvPr>
+        </p:nvSpPr>
+        <p:spPr/>
+        <p:txBody>
+          <a:bodyPr/>
+          <a:lstStyle/>
+          <a:p>
+            <a:r>
+              <a:rPr lang="en-US" dirty="0"/>
+              <a:t>The specification is produced during the analysis activities</a:t>
+            </a:r>
+          </a:p>
+          <a:p>
+            <a:r>
+              <a:rPr lang="en-US" dirty="0"/>
+              <a:t>The specification describes how what is being build </a:t>
+            </a:r>
+          </a:p>
+          <a:p>
+            <a:pPr lvl="1"/>
+            <a:r>
+              <a:rPr lang="en-US" dirty="0"/>
+              <a:t>Will function and perform</a:t>
+            </a:r>
+          </a:p>
+          <a:p>
+            <a:pPr lvl="1"/>
+            <a:r>
+              <a:rPr lang="en-US" dirty="0"/>
+              <a:t>Will interact with users and other systems</a:t>
+            </a:r>
+          </a:p>
+          <a:p>
+            <a:pPr lvl="1"/>
+            <a:r>
+              <a:rPr lang="en-US" dirty="0"/>
+              <a:t>Will interact with the organizational environment</a:t>
+            </a:r>
+          </a:p>
+          <a:p>
+            <a:r>
+              <a:rPr lang="en-US" dirty="0"/>
+              <a:t>The specification can take many forms</a:t>
+            </a:r>
+          </a:p>
+          <a:p>
+            <a:pPr lvl="1"/>
+            <a:r>
+              <a:rPr lang="en-US" dirty="0"/>
+              <a:t>A common part of Agile specs is a complete set of acceptance tests</a:t>
+            </a:r>
+          </a:p>
+          <a:p>
+            <a:r>
+              <a:rPr lang="en-US" dirty="0"/>
+              <a:t>Role of the spec</a:t>
+            </a:r>
+          </a:p>
+          <a:p>
+            <a:pPr lvl="1"/>
+            <a:r>
+              <a:rPr lang="en-US" dirty="0"/>
+              <a:t>Developers must define exactly how their code will work</a:t>
+            </a:r>
+          </a:p>
+          <a:p>
+            <a:pPr lvl="1"/>
+            <a:r>
+              <a:rPr lang="en-US" dirty="0"/>
+              <a:t>Enables testers to develop the quality control criteria for testing</a:t>
+            </a:r>
+          </a:p>
+          <a:p>
+            <a:r>
+              <a:rPr lang="en-US" dirty="0"/>
+              <a:t>A critical part of the specification is how the system will meet the security and safety requirements</a:t>
+            </a:r>
+            <a:endParaRPr lang="en-CA" dirty="0"/>
+          </a:p>
+        </p:txBody>
+      </p:sp>
+      <p:sp>
+        <p:nvSpPr>
+          <p:cNvPr id="4" name="Footer Placeholder 3">
+            <a:extLst>
+              <a:ext uri="{FF2B5EF4-FFF2-40B4-BE49-F238E27FC236}">
+                <a16:creationId xmlns:a16="http://schemas.microsoft.com/office/drawing/2014/main" id="{DC53F4CA-34E5-407B-9D2B-496BA009FC86}"/>
+              </a:ext>
+            </a:extLst>
+          </p:cNvPr>
+          <p:cNvSpPr>
+            <a:spLocks noGrp="1"/>
+          </p:cNvSpPr>
+          <p:nvPr>
+            <p:ph type="ftr" sz="quarter" idx="11"/>
+          </p:nvPr>
+        </p:nvSpPr>
+        <p:spPr>
+          <a:xfrm>
+            <a:off x="250289" y="7966980"/>
+            <a:ext cx="5441950" cy="138499"/>
+          </a:xfrm>
+        </p:spPr>
+        <p:txBody>
+          <a:bodyPr/>
+          <a:lstStyle/>
+          <a:p>
+            <a:pPr algn="l">
+              <a:defRPr/>
+            </a:pPr>
+            <a:r>
+              <a:rPr lang="en-US"/>
+              <a:t>Copyright © 2021 Elephant Scale. All rights reserved.</a:t>
+            </a:r>
+            <a:endParaRPr lang="en-US" dirty="0"/>
+          </a:p>
+        </p:txBody>
+      </p:sp>
+      <p:sp>
+        <p:nvSpPr>
+          <p:cNvPr id="5" name="Slide Number Placeholder 4">
+            <a:extLst>
+              <a:ext uri="{FF2B5EF4-FFF2-40B4-BE49-F238E27FC236}">
+                <a16:creationId xmlns:a16="http://schemas.microsoft.com/office/drawing/2014/main" id="{10B93FD6-12D9-4341-A2AA-BB491A44F91C}"/>
+              </a:ext>
+            </a:extLst>
+          </p:cNvPr>
+          <p:cNvSpPr>
+            <a:spLocks noGrp="1"/>
+          </p:cNvSpPr>
+          <p:nvPr>
+            <p:ph type="sldNum" sz="quarter" idx="12"/>
+          </p:nvPr>
+        </p:nvSpPr>
+        <p:spPr/>
+        <p:txBody>
+          <a:bodyPr/>
+          <a:lstStyle/>
+          <a:p>
+            <a:pPr>
+              <a:defRPr/>
+            </a:pPr>
+            <a:fld id="{77EF9825-4C23-4085-A4E3-B5565466BD91}" type="slidenum">
+              <a:rPr lang="en-US" smtClean="0"/>
+              <a:pPr>
+                <a:defRPr/>
+              </a:pPr>
+              <a:t>27</a:t>
+            </a:fld>
+            <a:endParaRPr lang="en-US" dirty="0"/>
+          </a:p>
+        </p:txBody>
+      </p:sp>
+      <p:sp>
+        <p:nvSpPr>
+          <p:cNvPr id="7" name="TextBox 6">
+            <a:extLst>
+              <a:ext uri="{FF2B5EF4-FFF2-40B4-BE49-F238E27FC236}">
+                <a16:creationId xmlns:a16="http://schemas.microsoft.com/office/drawing/2014/main" id="{A2C12D3F-D948-41CA-B239-66BE76C121F0}"/>
+              </a:ext>
+            </a:extLst>
+          </p:cNvPr>
+          <p:cNvSpPr txBox="1"/>
+          <p:nvPr/>
+        </p:nvSpPr>
+        <p:spPr>
+          <a:xfrm>
+            <a:off x="1586593" y="6748285"/>
+            <a:ext cx="6199414" cy="584775"/>
+          </a:xfrm>
+          <a:prstGeom prst="rect">
+            <a:avLst/>
+          </a:prstGeom>
+          <a:noFill/>
+        </p:spPr>
+        <p:txBody>
+          <a:bodyPr wrap="square">
+            <a:spAutoFit/>
+          </a:bodyPr>
+          <a:lstStyle/>
+          <a:p>
+            <a:pPr algn="ctr"/>
+            <a:r>
+              <a:rPr lang="en-US" sz="1600" i="1" dirty="0">
+                <a:solidFill>
+                  <a:schemeClr val="bg2"/>
+                </a:solidFill>
+              </a:rPr>
+              <a:t>“If there is not enough information to write a test to a spec item, you don’t have enough information to write code to implement it.”</a:t>
+            </a:r>
+          </a:p>
+        </p:txBody>
+      </p:sp>
+    </p:spTree>
+    <p:extLst>
+      <p:ext uri="{BB962C8B-B14F-4D97-AF65-F5344CB8AC3E}">
+        <p14:creationId xmlns:p14="http://schemas.microsoft.com/office/powerpoint/2010/main" val="269232032"/>
+      </p:ext>
+    </p:extLst>
+  </p:cSld>
+  <p:clrMapOvr>
+    <a:masterClrMapping/>
+  </p:clrMapOvr>
+</p:sld>
+</file>
+
+<file path=ppt/slides/slide28.xml><?xml version="1.0" encoding="utf-8"?>
+<p:sld xmlns:a="http://schemas.openxmlformats.org/drawingml/2006/main" xmlns:r="http://schemas.openxmlformats.org/officeDocument/2006/relationships" xmlns:p="http://schemas.openxmlformats.org/presentationml/2006/main">
+  <p:cSld>
+    <p:spTree>
+      <p:nvGrpSpPr>
+        <p:cNvPr id="1" name=""/>
+        <p:cNvGrpSpPr/>
+        <p:nvPr/>
+      </p:nvGrpSpPr>
+      <p:grpSpPr>
+        <a:xfrm>
+          <a:off x="0" y="0"/>
+          <a:ext cx="0" cy="0"/>
+          <a:chOff x="0" y="0"/>
+          <a:chExt cx="0" cy="0"/>
+        </a:xfrm>
+      </p:grpSpPr>
+      <p:sp>
+        <p:nvSpPr>
+          <p:cNvPr id="2" name="Title 1">
+            <a:extLst>
+              <a:ext uri="{FF2B5EF4-FFF2-40B4-BE49-F238E27FC236}">
+                <a16:creationId xmlns:a16="http://schemas.microsoft.com/office/drawing/2014/main" id="{A3A4E281-69F4-408D-9BEB-C278EAC8ACA2}"/>
+              </a:ext>
+            </a:extLst>
+          </p:cNvPr>
+          <p:cNvSpPr>
+            <a:spLocks noGrp="1"/>
+          </p:cNvSpPr>
+          <p:nvPr>
+            <p:ph type="title"/>
+          </p:nvPr>
+        </p:nvSpPr>
+        <p:spPr/>
+        <p:txBody>
+          <a:bodyPr/>
+          <a:lstStyle/>
+          <a:p>
+            <a:r>
+              <a:rPr lang="en-US" dirty="0"/>
+              <a:t>Test, Test and Test Again</a:t>
+            </a:r>
+            <a:endParaRPr lang="en-CA" dirty="0"/>
+          </a:p>
+        </p:txBody>
+      </p:sp>
+      <p:sp>
+        <p:nvSpPr>
+          <p:cNvPr id="4" name="Footer Placeholder 3">
+            <a:extLst>
+              <a:ext uri="{FF2B5EF4-FFF2-40B4-BE49-F238E27FC236}">
+                <a16:creationId xmlns:a16="http://schemas.microsoft.com/office/drawing/2014/main" id="{8A13FB6A-7F44-489E-A4C9-D51E97100BD1}"/>
+              </a:ext>
+            </a:extLst>
+          </p:cNvPr>
+          <p:cNvSpPr>
+            <a:spLocks noGrp="1"/>
+          </p:cNvSpPr>
+          <p:nvPr>
+            <p:ph type="ftr" sz="quarter" idx="11"/>
+          </p:nvPr>
+        </p:nvSpPr>
+        <p:spPr/>
+        <p:txBody>
+          <a:bodyPr/>
+          <a:lstStyle/>
+          <a:p>
+            <a:pPr algn="l">
+              <a:defRPr/>
+            </a:pPr>
+            <a:r>
+              <a:rPr lang="en-US"/>
+              <a:t>Copyright © 2021 Elephant Scale. All rights reserved.</a:t>
+            </a:r>
+            <a:endParaRPr lang="en-US" dirty="0"/>
+          </a:p>
+        </p:txBody>
+      </p:sp>
+      <p:sp>
+        <p:nvSpPr>
+          <p:cNvPr id="5" name="Slide Number Placeholder 4">
+            <a:extLst>
+              <a:ext uri="{FF2B5EF4-FFF2-40B4-BE49-F238E27FC236}">
+                <a16:creationId xmlns:a16="http://schemas.microsoft.com/office/drawing/2014/main" id="{603E85A0-8BE6-4F31-A465-CF8C1C015E00}"/>
+              </a:ext>
+            </a:extLst>
+          </p:cNvPr>
+          <p:cNvSpPr>
+            <a:spLocks noGrp="1"/>
+          </p:cNvSpPr>
+          <p:nvPr>
+            <p:ph type="sldNum" sz="quarter" idx="12"/>
+          </p:nvPr>
+        </p:nvSpPr>
+        <p:spPr/>
+        <p:txBody>
+          <a:bodyPr/>
+          <a:lstStyle/>
+          <a:p>
+            <a:pPr>
+              <a:defRPr/>
+            </a:pPr>
+            <a:fld id="{77EF9825-4C23-4085-A4E3-B5565466BD91}" type="slidenum">
+              <a:rPr lang="en-US" smtClean="0"/>
+              <a:pPr>
+                <a:defRPr/>
+              </a:pPr>
+              <a:t>28</a:t>
+            </a:fld>
+            <a:endParaRPr lang="en-US" dirty="0"/>
+          </a:p>
+        </p:txBody>
+      </p:sp>
+      <p:pic>
+        <p:nvPicPr>
+          <p:cNvPr id="6" name="Content Placeholder 7">
+            <a:extLst>
+              <a:ext uri="{FF2B5EF4-FFF2-40B4-BE49-F238E27FC236}">
+                <a16:creationId xmlns:a16="http://schemas.microsoft.com/office/drawing/2014/main" id="{55259687-8FEF-455F-B942-2976C06FB510}"/>
+              </a:ext>
+            </a:extLst>
+          </p:cNvPr>
+          <p:cNvPicPr>
+            <a:picLocks noChangeAspect="1"/>
+          </p:cNvPicPr>
+          <p:nvPr/>
+        </p:nvPicPr>
+        <p:blipFill>
+          <a:blip r:embed="rId2">
+            <a:lum/>
+            <a:alphaModFix/>
+          </a:blip>
+          <a:srcRect/>
+          <a:stretch>
+            <a:fillRect/>
+          </a:stretch>
+        </p:blipFill>
+        <p:spPr>
+          <a:xfrm>
+            <a:off x="5448300" y="1806643"/>
+            <a:ext cx="2486025" cy="3171825"/>
+          </a:xfrm>
+          <a:prstGeom prst="rect">
+            <a:avLst/>
+          </a:prstGeom>
+          <a:noFill/>
+          <a:ln>
+            <a:noFill/>
+          </a:ln>
+        </p:spPr>
+      </p:pic>
+      <p:sp>
+        <p:nvSpPr>
+          <p:cNvPr id="7" name="TextBox 6">
+            <a:extLst>
+              <a:ext uri="{FF2B5EF4-FFF2-40B4-BE49-F238E27FC236}">
+                <a16:creationId xmlns:a16="http://schemas.microsoft.com/office/drawing/2014/main" id="{CAAC952E-BF2D-49E8-95A1-ABD4657B707D}"/>
+              </a:ext>
+            </a:extLst>
+          </p:cNvPr>
+          <p:cNvSpPr txBox="1"/>
+          <p:nvPr/>
+        </p:nvSpPr>
+        <p:spPr>
+          <a:xfrm>
+            <a:off x="907402" y="1634331"/>
+            <a:ext cx="3778898" cy="4185761"/>
+          </a:xfrm>
+          <a:prstGeom prst="rect">
+            <a:avLst/>
+          </a:prstGeom>
+          <a:noFill/>
+        </p:spPr>
+        <p:txBody>
+          <a:bodyPr wrap="square" rtlCol="0">
+            <a:spAutoFit/>
+          </a:bodyPr>
+          <a:lstStyle/>
+          <a:p>
+            <a:pPr marL="0" marR="0" lvl="0" indent="0" hangingPunct="0">
+              <a:lnSpc>
+                <a:spcPct val="100000"/>
+              </a:lnSpc>
+              <a:spcBef>
+                <a:spcPts val="0"/>
+              </a:spcBef>
+              <a:spcAft>
+                <a:spcPts val="0"/>
+              </a:spcAft>
+              <a:buNone/>
+              <a:tabLst/>
+              <a:defRPr sz="1800"/>
+            </a:pPr>
+            <a:r>
+              <a:rPr lang="en-CA" sz="1800" b="1" i="1" u="none" strike="noStrike" kern="1200" cap="none" dirty="0">
+                <a:ln>
+                  <a:noFill/>
+                </a:ln>
+                <a:solidFill>
+                  <a:schemeClr val="bg2"/>
+                </a:solidFill>
+                <a:latin typeface="Liberation Sans" pitchFamily="18"/>
+                <a:ea typeface="Source Han Sans CN Regular" pitchFamily="2"/>
+                <a:cs typeface="Lohit Devanagari" pitchFamily="2"/>
+              </a:rPr>
+              <a:t>More than the act of testing, the act of designing tests is one of the best bug preventers known.</a:t>
+            </a:r>
+          </a:p>
+          <a:p>
+            <a:pPr marL="0" marR="0" lvl="0" indent="0" hangingPunct="0">
+              <a:lnSpc>
+                <a:spcPct val="100000"/>
+              </a:lnSpc>
+              <a:spcBef>
+                <a:spcPts val="0"/>
+              </a:spcBef>
+              <a:spcAft>
+                <a:spcPts val="0"/>
+              </a:spcAft>
+              <a:buNone/>
+              <a:tabLst/>
+              <a:defRPr sz="1800"/>
+            </a:pPr>
+            <a:endParaRPr lang="en-CA" sz="1800" b="1" i="1" u="none" strike="noStrike" kern="1200" cap="none" dirty="0">
+              <a:ln>
+                <a:noFill/>
+              </a:ln>
+              <a:solidFill>
+                <a:schemeClr val="bg2"/>
+              </a:solidFill>
+              <a:latin typeface="Liberation Sans" pitchFamily="18"/>
+              <a:ea typeface="Source Han Sans CN Regular" pitchFamily="2"/>
+              <a:cs typeface="Lohit Devanagari" pitchFamily="2"/>
+            </a:endParaRPr>
+          </a:p>
+          <a:p>
+            <a:pPr marL="0" marR="0" lvl="0" indent="0" hangingPunct="0">
+              <a:lnSpc>
+                <a:spcPct val="100000"/>
+              </a:lnSpc>
+              <a:spcBef>
+                <a:spcPts val="0"/>
+              </a:spcBef>
+              <a:spcAft>
+                <a:spcPts val="0"/>
+              </a:spcAft>
+              <a:buNone/>
+              <a:tabLst/>
+              <a:defRPr sz="1800"/>
+            </a:pPr>
+            <a:r>
+              <a:rPr lang="en-CA" sz="1800" b="1" i="1" u="none" strike="noStrike" kern="1200" cap="none" dirty="0">
+                <a:ln>
+                  <a:noFill/>
+                </a:ln>
+                <a:solidFill>
+                  <a:schemeClr val="bg2"/>
+                </a:solidFill>
+                <a:latin typeface="Liberation Sans" pitchFamily="18"/>
+                <a:ea typeface="Source Han Sans CN Regular" pitchFamily="2"/>
+                <a:cs typeface="Lohit Devanagari" pitchFamily="2"/>
+              </a:rPr>
+              <a:t>The thinking that must be done to create a useful test can discover and eliminate bugs at every stage in the creation of software, from conception to specification, to design, coding and the rest.</a:t>
+            </a:r>
+          </a:p>
+          <a:p>
+            <a:pPr marL="0" marR="0" lvl="0" indent="0" hangingPunct="0">
+              <a:lnSpc>
+                <a:spcPct val="100000"/>
+              </a:lnSpc>
+              <a:spcBef>
+                <a:spcPts val="0"/>
+              </a:spcBef>
+              <a:spcAft>
+                <a:spcPts val="0"/>
+              </a:spcAft>
+              <a:buNone/>
+              <a:tabLst/>
+              <a:defRPr sz="1800"/>
+            </a:pPr>
+            <a:r>
+              <a:rPr lang="en-CA" sz="1400" b="1" i="1" u="none" strike="noStrike" kern="1200" cap="none" dirty="0">
+                <a:ln>
+                  <a:noFill/>
+                </a:ln>
+                <a:solidFill>
+                  <a:schemeClr val="bg2"/>
+                </a:solidFill>
+                <a:latin typeface="Liberation Sans" pitchFamily="18"/>
+                <a:ea typeface="Source Han Sans CN Regular" pitchFamily="2"/>
+                <a:cs typeface="Lohit Devanagari" pitchFamily="2"/>
+              </a:rPr>
+              <a:t> </a:t>
+            </a:r>
+          </a:p>
+          <a:p>
+            <a:pPr marL="0" marR="0" lvl="0" indent="0" algn="l" hangingPunct="0">
+              <a:lnSpc>
+                <a:spcPct val="100000"/>
+              </a:lnSpc>
+              <a:spcBef>
+                <a:spcPts val="0"/>
+              </a:spcBef>
+              <a:spcAft>
+                <a:spcPts val="0"/>
+              </a:spcAft>
+              <a:buNone/>
+              <a:tabLst/>
+              <a:defRPr sz="1800"/>
+            </a:pPr>
+            <a:r>
+              <a:rPr lang="en-CA" sz="1800" b="1" i="1" u="none" strike="noStrike" kern="1200" cap="none" dirty="0">
+                <a:ln>
+                  <a:noFill/>
+                </a:ln>
+                <a:solidFill>
+                  <a:srgbClr val="C00000"/>
+                </a:solidFill>
+                <a:latin typeface="Liberation Sans" pitchFamily="18"/>
+                <a:ea typeface="Source Han Sans CN Regular" pitchFamily="2"/>
+                <a:cs typeface="Lohit Devanagari" pitchFamily="2"/>
+              </a:rPr>
+              <a:t>If you can't test it, don't build it.</a:t>
+            </a:r>
+          </a:p>
+          <a:p>
+            <a:pPr marL="0" marR="0" lvl="0" indent="0" algn="l" hangingPunct="0">
+              <a:lnSpc>
+                <a:spcPct val="100000"/>
+              </a:lnSpc>
+              <a:spcBef>
+                <a:spcPts val="0"/>
+              </a:spcBef>
+              <a:spcAft>
+                <a:spcPts val="0"/>
+              </a:spcAft>
+              <a:buNone/>
+              <a:tabLst/>
+              <a:defRPr sz="1800"/>
+            </a:pPr>
+            <a:r>
+              <a:rPr lang="en-CA" sz="1800" b="1" i="1" u="none" strike="noStrike" kern="1200" cap="none" dirty="0">
+                <a:ln>
+                  <a:noFill/>
+                </a:ln>
+                <a:solidFill>
+                  <a:srgbClr val="C00000"/>
+                </a:solidFill>
+                <a:latin typeface="Liberation Sans" pitchFamily="18"/>
+                <a:ea typeface="Source Han Sans CN Regular" pitchFamily="2"/>
+                <a:cs typeface="Lohit Devanagari" pitchFamily="2"/>
+              </a:rPr>
+              <a:t>If you don't test it, rip it out.</a:t>
+            </a:r>
+          </a:p>
+          <a:p>
+            <a:endParaRPr lang="en-CA" dirty="0">
+              <a:solidFill>
+                <a:schemeClr val="bg2"/>
+              </a:solidFill>
+            </a:endParaRPr>
+          </a:p>
+        </p:txBody>
+      </p:sp>
+      <p:sp>
+        <p:nvSpPr>
+          <p:cNvPr id="8" name="TextBox 7">
+            <a:extLst>
+              <a:ext uri="{FF2B5EF4-FFF2-40B4-BE49-F238E27FC236}">
+                <a16:creationId xmlns:a16="http://schemas.microsoft.com/office/drawing/2014/main" id="{5E354E8D-F359-432F-87DE-81804424EE39}"/>
+              </a:ext>
+            </a:extLst>
+          </p:cNvPr>
+          <p:cNvSpPr txBox="1"/>
+          <p:nvPr/>
+        </p:nvSpPr>
+        <p:spPr>
+          <a:xfrm>
+            <a:off x="6047365" y="5215731"/>
+            <a:ext cx="1287894" cy="326841"/>
+          </a:xfrm>
+          <a:prstGeom prst="rect">
+            <a:avLst/>
+          </a:prstGeom>
+          <a:noFill/>
+          <a:ln>
+            <a:noFill/>
+          </a:ln>
+        </p:spPr>
+        <p:txBody>
+          <a:bodyPr wrap="none" lIns="90000" tIns="45000" rIns="90000" bIns="45000" anchorCtr="0" compatLnSpc="0">
+            <a:spAutoFit/>
+          </a:bodyPr>
+          <a:lstStyle/>
+          <a:p>
+            <a:pPr marL="0" marR="0" lvl="0" indent="0" hangingPunct="0">
+              <a:lnSpc>
+                <a:spcPct val="100000"/>
+              </a:lnSpc>
+              <a:spcBef>
+                <a:spcPts val="0"/>
+              </a:spcBef>
+              <a:spcAft>
+                <a:spcPts val="0"/>
+              </a:spcAft>
+              <a:buNone/>
+              <a:tabLst/>
+              <a:defRPr sz="1600"/>
+            </a:pPr>
+            <a:r>
+              <a:rPr lang="en-CA" sz="1600" b="0" i="1" u="none" strike="noStrike" kern="1200" cap="none" dirty="0">
+                <a:ln>
+                  <a:noFill/>
+                </a:ln>
+                <a:solidFill>
+                  <a:schemeClr val="bg2"/>
+                </a:solidFill>
+                <a:latin typeface="Liberation Sans" pitchFamily="18"/>
+                <a:ea typeface="Source Han Sans CN Regular" pitchFamily="2"/>
+                <a:cs typeface="Lohit Devanagari" pitchFamily="2"/>
+              </a:rPr>
+              <a:t>Boris </a:t>
+            </a:r>
+            <a:r>
+              <a:rPr lang="en-CA" sz="1600" b="0" i="1" u="none" strike="noStrike" kern="1200" cap="none" dirty="0" err="1">
+                <a:ln>
+                  <a:noFill/>
+                </a:ln>
+                <a:solidFill>
+                  <a:schemeClr val="bg2"/>
+                </a:solidFill>
+                <a:latin typeface="Liberation Sans" pitchFamily="18"/>
+                <a:ea typeface="Source Han Sans CN Regular" pitchFamily="2"/>
+                <a:cs typeface="Lohit Devanagari" pitchFamily="2"/>
+              </a:rPr>
+              <a:t>Beizer</a:t>
+            </a:r>
+            <a:endParaRPr lang="en-CA" sz="1600" b="0" i="1" u="none" strike="noStrike" kern="1200" cap="none" dirty="0">
+              <a:ln>
+                <a:noFill/>
+              </a:ln>
+              <a:solidFill>
+                <a:schemeClr val="bg2"/>
+              </a:solidFill>
+              <a:latin typeface="Liberation Sans" pitchFamily="18"/>
+              <a:ea typeface="Source Han Sans CN Regular" pitchFamily="2"/>
+              <a:cs typeface="Lohit Devanagari" pitchFamily="2"/>
+            </a:endParaRPr>
+          </a:p>
+        </p:txBody>
+      </p:sp>
+    </p:spTree>
+    <p:extLst>
+      <p:ext uri="{BB962C8B-B14F-4D97-AF65-F5344CB8AC3E}">
+        <p14:creationId xmlns:p14="http://schemas.microsoft.com/office/powerpoint/2010/main" val="2811961823"/>
+      </p:ext>
+    </p:extLst>
+  </p:cSld>
+  <p:clrMapOvr>
+    <a:masterClrMapping/>
+  </p:clrMapOvr>
+</p:sld>
+</file>
+
+<file path=ppt/slides/slide29.xml><?xml version="1.0" encoding="utf-8"?>
+<p:sld xmlns:a="http://schemas.openxmlformats.org/drawingml/2006/main" xmlns:r="http://schemas.openxmlformats.org/officeDocument/2006/relationships" xmlns:p="http://schemas.openxmlformats.org/presentationml/2006/main">
+  <p:cSld>
+    <p:spTree>
+      <p:nvGrpSpPr>
+        <p:cNvPr id="1" name=""/>
+        <p:cNvGrpSpPr/>
+        <p:nvPr/>
+      </p:nvGrpSpPr>
+      <p:grpSpPr>
+        <a:xfrm>
+          <a:off x="0" y="0"/>
+          <a:ext cx="0" cy="0"/>
+          <a:chOff x="0" y="0"/>
+          <a:chExt cx="0" cy="0"/>
+        </a:xfrm>
+      </p:grpSpPr>
+      <p:sp>
+        <p:nvSpPr>
+          <p:cNvPr id="2" name="Title 1">
+            <a:extLst>
+              <a:ext uri="{FF2B5EF4-FFF2-40B4-BE49-F238E27FC236}">
+                <a16:creationId xmlns:a16="http://schemas.microsoft.com/office/drawing/2014/main" id="{F9B0E21F-0060-461A-9C7D-E4AA77233C6C}"/>
+              </a:ext>
+            </a:extLst>
+          </p:cNvPr>
+          <p:cNvSpPr>
+            <a:spLocks noGrp="1"/>
+          </p:cNvSpPr>
+          <p:nvPr>
+            <p:ph type="title"/>
+          </p:nvPr>
+        </p:nvSpPr>
+        <p:spPr/>
+        <p:txBody>
+          <a:bodyPr/>
+          <a:lstStyle/>
+          <a:p>
+            <a:r>
+              <a:rPr lang="en-US" dirty="0"/>
+              <a:t>IEEE Best Practices for Specs</a:t>
+            </a:r>
+            <a:endParaRPr lang="en-CA" dirty="0"/>
+          </a:p>
+        </p:txBody>
+      </p:sp>
+      <p:sp>
+        <p:nvSpPr>
+          <p:cNvPr id="4" name="Footer Placeholder 3">
+            <a:extLst>
+              <a:ext uri="{FF2B5EF4-FFF2-40B4-BE49-F238E27FC236}">
+                <a16:creationId xmlns:a16="http://schemas.microsoft.com/office/drawing/2014/main" id="{0A781DB0-3D1A-4E70-99EB-3E4FF1EB8182}"/>
+              </a:ext>
+            </a:extLst>
+          </p:cNvPr>
+          <p:cNvSpPr>
+            <a:spLocks noGrp="1"/>
+          </p:cNvSpPr>
+          <p:nvPr>
+            <p:ph type="ftr" sz="quarter" idx="11"/>
+          </p:nvPr>
+        </p:nvSpPr>
+        <p:spPr/>
+        <p:txBody>
+          <a:bodyPr/>
+          <a:lstStyle/>
+          <a:p>
+            <a:pPr algn="l">
+              <a:defRPr/>
+            </a:pPr>
+            <a:r>
+              <a:rPr lang="en-US"/>
+              <a:t>Copyright © 2021 Elephant Scale. All rights reserved.</a:t>
+            </a:r>
+            <a:endParaRPr lang="en-US" dirty="0"/>
+          </a:p>
+        </p:txBody>
+      </p:sp>
+      <p:sp>
+        <p:nvSpPr>
+          <p:cNvPr id="5" name="Slide Number Placeholder 4">
+            <a:extLst>
+              <a:ext uri="{FF2B5EF4-FFF2-40B4-BE49-F238E27FC236}">
+                <a16:creationId xmlns:a16="http://schemas.microsoft.com/office/drawing/2014/main" id="{B9D3E2B5-6B6C-4101-987B-EC480FA08CE3}"/>
+              </a:ext>
+            </a:extLst>
+          </p:cNvPr>
+          <p:cNvSpPr>
+            <a:spLocks noGrp="1"/>
+          </p:cNvSpPr>
+          <p:nvPr>
+            <p:ph type="sldNum" sz="quarter" idx="12"/>
+          </p:nvPr>
+        </p:nvSpPr>
+        <p:spPr/>
+        <p:txBody>
+          <a:bodyPr/>
+          <a:lstStyle/>
+          <a:p>
+            <a:pPr>
+              <a:defRPr/>
+            </a:pPr>
+            <a:fld id="{77EF9825-4C23-4085-A4E3-B5565466BD91}" type="slidenum">
+              <a:rPr lang="en-US" smtClean="0"/>
+              <a:pPr>
+                <a:defRPr/>
+              </a:pPr>
+              <a:t>29</a:t>
+            </a:fld>
+            <a:endParaRPr lang="en-US" dirty="0"/>
+          </a:p>
+        </p:txBody>
+      </p:sp>
+      <p:pic>
+        <p:nvPicPr>
+          <p:cNvPr id="7" name="Picture 6" descr="Shape&#10;&#10;Description automatically generated with low confidence">
+            <a:extLst>
+              <a:ext uri="{FF2B5EF4-FFF2-40B4-BE49-F238E27FC236}">
+                <a16:creationId xmlns:a16="http://schemas.microsoft.com/office/drawing/2014/main" id="{A4995834-92F9-4E93-AE1B-10CDCB2191F4}"/>
+              </a:ext>
+            </a:extLst>
+          </p:cNvPr>
+          <p:cNvPicPr>
+            <a:picLocks noChangeAspect="1"/>
+          </p:cNvPicPr>
+          <p:nvPr/>
+        </p:nvPicPr>
+        <p:blipFill>
+          <a:blip r:embed="rId3">
+            <a:extLst>
+              <a:ext uri="{28A0092B-C50C-407E-A947-70E740481C1C}">
+                <a14:useLocalDpi xmlns:a14="http://schemas.microsoft.com/office/drawing/2010/main" val="0"/>
+              </a:ext>
+            </a:extLst>
+          </a:blip>
+          <a:stretch>
+            <a:fillRect/>
+          </a:stretch>
+        </p:blipFill>
+        <p:spPr>
+          <a:xfrm>
+            <a:off x="876300" y="1427981"/>
+            <a:ext cx="7349644" cy="5441899"/>
+          </a:xfrm>
+          <a:prstGeom prst="rect">
+            <a:avLst/>
+          </a:prstGeom>
+        </p:spPr>
+      </p:pic>
+    </p:spTree>
+    <p:extLst>
+      <p:ext uri="{BB962C8B-B14F-4D97-AF65-F5344CB8AC3E}">
+        <p14:creationId xmlns:p14="http://schemas.microsoft.com/office/powerpoint/2010/main" val="59369211"/>
+      </p:ext>
+    </p:extLst>
+  </p:cSld>
+  <p:clrMapOvr>
+    <a:masterClrMapping/>
+  </p:clrMapOvr>
+</p:sld>
+</file>
+
 <file path=ppt/slides/slide3.xml><?xml version="1.0" encoding="utf-8"?>
 <p:sld xmlns:a="http://schemas.openxmlformats.org/drawingml/2006/main" xmlns:r="http://schemas.openxmlformats.org/officeDocument/2006/relationships" xmlns:p="http://schemas.openxmlformats.org/presentationml/2006/main">
   <p:cSld>
@@ -5989,6 +8577,1876 @@
     <p:extLst>
       <p:ext uri="{BB962C8B-B14F-4D97-AF65-F5344CB8AC3E}">
         <p14:creationId xmlns:p14="http://schemas.microsoft.com/office/powerpoint/2010/main" val="3233065514"/>
+      </p:ext>
+    </p:extLst>
+  </p:cSld>
+  <p:clrMapOvr>
+    <a:masterClrMapping/>
+  </p:clrMapOvr>
+</p:sld>
+</file>
+
+<file path=ppt/slides/slide30.xml><?xml version="1.0" encoding="utf-8"?>
+<p:sld xmlns:a="http://schemas.openxmlformats.org/drawingml/2006/main" xmlns:r="http://schemas.openxmlformats.org/officeDocument/2006/relationships" xmlns:p="http://schemas.openxmlformats.org/presentationml/2006/main">
+  <p:cSld>
+    <p:spTree>
+      <p:nvGrpSpPr>
+        <p:cNvPr id="1" name=""/>
+        <p:cNvGrpSpPr/>
+        <p:nvPr/>
+      </p:nvGrpSpPr>
+      <p:grpSpPr>
+        <a:xfrm>
+          <a:off x="0" y="0"/>
+          <a:ext cx="0" cy="0"/>
+          <a:chOff x="0" y="0"/>
+          <a:chExt cx="0" cy="0"/>
+        </a:xfrm>
+      </p:grpSpPr>
+      <p:sp>
+        <p:nvSpPr>
+          <p:cNvPr id="7" name="Subtitle 6">
+            <a:extLst>
+              <a:ext uri="{FF2B5EF4-FFF2-40B4-BE49-F238E27FC236}">
+                <a16:creationId xmlns:a16="http://schemas.microsoft.com/office/drawing/2014/main" id="{D3E5BCD7-0D42-43D9-A3B7-B916FD9DF4A8}"/>
+              </a:ext>
+            </a:extLst>
+          </p:cNvPr>
+          <p:cNvSpPr>
+            <a:spLocks noGrp="1"/>
+          </p:cNvSpPr>
+          <p:nvPr>
+            <p:ph type="subTitle" sz="quarter" idx="1"/>
+          </p:nvPr>
+        </p:nvSpPr>
+        <p:spPr/>
+        <p:txBody>
+          <a:bodyPr/>
+          <a:lstStyle/>
+          <a:p>
+            <a:r>
+              <a:rPr lang="en-US" dirty="0"/>
+              <a:t>DevOps and </a:t>
+            </a:r>
+            <a:r>
+              <a:rPr lang="en-US" dirty="0" err="1"/>
+              <a:t>DevSecOps</a:t>
+            </a:r>
+            <a:endParaRPr lang="en-CA" dirty="0"/>
+          </a:p>
+        </p:txBody>
+      </p:sp>
+      <p:sp>
+        <p:nvSpPr>
+          <p:cNvPr id="6" name="Title 5">
+            <a:extLst>
+              <a:ext uri="{FF2B5EF4-FFF2-40B4-BE49-F238E27FC236}">
+                <a16:creationId xmlns:a16="http://schemas.microsoft.com/office/drawing/2014/main" id="{B180A68F-B83B-448F-A4AA-3D0FB6431414}"/>
+              </a:ext>
+            </a:extLst>
+          </p:cNvPr>
+          <p:cNvSpPr>
+            <a:spLocks noGrp="1"/>
+          </p:cNvSpPr>
+          <p:nvPr>
+            <p:ph type="ctrTitle" sz="quarter"/>
+          </p:nvPr>
+        </p:nvSpPr>
+        <p:spPr/>
+        <p:txBody>
+          <a:bodyPr/>
+          <a:lstStyle/>
+          <a:p>
+            <a:r>
+              <a:rPr lang="en-US" dirty="0"/>
+              <a:t>System Lifecycles and SDLCs</a:t>
+            </a:r>
+            <a:endParaRPr lang="en-CA" dirty="0"/>
+          </a:p>
+        </p:txBody>
+      </p:sp>
+      <p:sp>
+        <p:nvSpPr>
+          <p:cNvPr id="4" name="Footer Placeholder 3">
+            <a:extLst>
+              <a:ext uri="{FF2B5EF4-FFF2-40B4-BE49-F238E27FC236}">
+                <a16:creationId xmlns:a16="http://schemas.microsoft.com/office/drawing/2014/main" id="{2AAA9AA2-F1A7-450E-B5F1-E8BF8D7363C6}"/>
+              </a:ext>
+            </a:extLst>
+          </p:cNvPr>
+          <p:cNvSpPr>
+            <a:spLocks noGrp="1"/>
+          </p:cNvSpPr>
+          <p:nvPr>
+            <p:ph type="ftr" sz="quarter" idx="4294967295"/>
+          </p:nvPr>
+        </p:nvSpPr>
+        <p:spPr>
+          <a:xfrm>
+            <a:off x="0" y="8032750"/>
+            <a:ext cx="5441950" cy="138113"/>
+          </a:xfrm>
+        </p:spPr>
+        <p:txBody>
+          <a:bodyPr/>
+          <a:lstStyle/>
+          <a:p>
+            <a:pPr algn="l">
+              <a:defRPr/>
+            </a:pPr>
+            <a:r>
+              <a:rPr lang="en-US"/>
+              <a:t>Copyright © 2017 Elephant Scale. All rights reserved.</a:t>
+            </a:r>
+            <a:endParaRPr lang="en-US" dirty="0"/>
+          </a:p>
+        </p:txBody>
+      </p:sp>
+      <p:sp>
+        <p:nvSpPr>
+          <p:cNvPr id="5" name="Slide Number Placeholder 4">
+            <a:extLst>
+              <a:ext uri="{FF2B5EF4-FFF2-40B4-BE49-F238E27FC236}">
+                <a16:creationId xmlns:a16="http://schemas.microsoft.com/office/drawing/2014/main" id="{BA31E350-A8CA-4B5B-81C7-6B2E66DD8C00}"/>
+              </a:ext>
+            </a:extLst>
+          </p:cNvPr>
+          <p:cNvSpPr>
+            <a:spLocks noGrp="1"/>
+          </p:cNvSpPr>
+          <p:nvPr>
+            <p:ph type="sldNum" sz="quarter" idx="4294967295"/>
+          </p:nvPr>
+        </p:nvSpPr>
+        <p:spPr>
+          <a:xfrm>
+            <a:off x="8826500" y="7961313"/>
+            <a:ext cx="546100" cy="273050"/>
+          </a:xfrm>
+        </p:spPr>
+        <p:txBody>
+          <a:bodyPr/>
+          <a:lstStyle/>
+          <a:p>
+            <a:pPr>
+              <a:defRPr/>
+            </a:pPr>
+            <a:fld id="{77EF9825-4C23-4085-A4E3-B5565466BD91}" type="slidenum">
+              <a:rPr lang="en-US" smtClean="0"/>
+              <a:pPr>
+                <a:defRPr/>
+              </a:pPr>
+              <a:t>30</a:t>
+            </a:fld>
+            <a:endParaRPr lang="en-US" dirty="0"/>
+          </a:p>
+        </p:txBody>
+      </p:sp>
+    </p:spTree>
+    <p:extLst>
+      <p:ext uri="{BB962C8B-B14F-4D97-AF65-F5344CB8AC3E}">
+        <p14:creationId xmlns:p14="http://schemas.microsoft.com/office/powerpoint/2010/main" val="1423092234"/>
+      </p:ext>
+    </p:extLst>
+  </p:cSld>
+  <p:clrMapOvr>
+    <a:masterClrMapping/>
+  </p:clrMapOvr>
+</p:sld>
+</file>
+
+<file path=ppt/slides/slide31.xml><?xml version="1.0" encoding="utf-8"?>
+<p:sld xmlns:a="http://schemas.openxmlformats.org/drawingml/2006/main" xmlns:r="http://schemas.openxmlformats.org/officeDocument/2006/relationships" xmlns:p="http://schemas.openxmlformats.org/presentationml/2006/main">
+  <p:cSld>
+    <p:spTree>
+      <p:nvGrpSpPr>
+        <p:cNvPr id="1" name=""/>
+        <p:cNvGrpSpPr/>
+        <p:nvPr/>
+      </p:nvGrpSpPr>
+      <p:grpSpPr>
+        <a:xfrm>
+          <a:off x="0" y="0"/>
+          <a:ext cx="0" cy="0"/>
+          <a:chOff x="0" y="0"/>
+          <a:chExt cx="0" cy="0"/>
+        </a:xfrm>
+      </p:grpSpPr>
+      <p:sp>
+        <p:nvSpPr>
+          <p:cNvPr id="2" name="Title 1">
+            <a:extLst>
+              <a:ext uri="{FF2B5EF4-FFF2-40B4-BE49-F238E27FC236}">
+                <a16:creationId xmlns:a16="http://schemas.microsoft.com/office/drawing/2014/main" id="{D23A86D5-E130-4FD7-8A02-E3CCDDE93DE8}"/>
+              </a:ext>
+            </a:extLst>
+          </p:cNvPr>
+          <p:cNvSpPr>
+            <a:spLocks noGrp="1"/>
+          </p:cNvSpPr>
+          <p:nvPr>
+            <p:ph type="title"/>
+          </p:nvPr>
+        </p:nvSpPr>
+        <p:spPr/>
+        <p:txBody>
+          <a:bodyPr/>
+          <a:lstStyle/>
+          <a:p>
+            <a:r>
+              <a:rPr lang="en-US" dirty="0"/>
+              <a:t>The Rise of DevOps</a:t>
+            </a:r>
+            <a:endParaRPr lang="en-CA" dirty="0"/>
+          </a:p>
+        </p:txBody>
+      </p:sp>
+      <p:sp>
+        <p:nvSpPr>
+          <p:cNvPr id="3" name="Content Placeholder 2">
+            <a:extLst>
+              <a:ext uri="{FF2B5EF4-FFF2-40B4-BE49-F238E27FC236}">
+                <a16:creationId xmlns:a16="http://schemas.microsoft.com/office/drawing/2014/main" id="{4AC9EF3B-A60D-47E1-9CEA-ACE2D70AADC2}"/>
+              </a:ext>
+            </a:extLst>
+          </p:cNvPr>
+          <p:cNvSpPr>
+            <a:spLocks noGrp="1"/>
+          </p:cNvSpPr>
+          <p:nvPr>
+            <p:ph idx="1"/>
+          </p:nvPr>
+        </p:nvSpPr>
+        <p:spPr>
+          <a:xfrm>
+            <a:off x="234950" y="994976"/>
+            <a:ext cx="8902700" cy="4082256"/>
+          </a:xfrm>
+        </p:spPr>
+        <p:txBody>
+          <a:bodyPr>
+            <a:normAutofit lnSpcReduction="10000"/>
+          </a:bodyPr>
+          <a:lstStyle/>
+          <a:p>
+            <a:r>
+              <a:rPr lang="en-US" dirty="0"/>
+              <a:t>DevOps is not a development methodology</a:t>
+            </a:r>
+          </a:p>
+          <a:p>
+            <a:r>
+              <a:rPr lang="en-US" dirty="0"/>
+              <a:t>It is a response to the virtualization like cloud providers</a:t>
+            </a:r>
+          </a:p>
+          <a:p>
+            <a:pPr lvl="1"/>
+            <a:r>
+              <a:rPr lang="en-US" dirty="0"/>
+              <a:t>Infrastructure is now developed virtually</a:t>
+            </a:r>
+          </a:p>
+          <a:p>
+            <a:pPr lvl="1"/>
+            <a:r>
+              <a:rPr lang="en-US" dirty="0"/>
+              <a:t>E.g., Terraform, Ansible, etc.</a:t>
+            </a:r>
+          </a:p>
+          <a:p>
+            <a:r>
+              <a:rPr lang="en-US" dirty="0"/>
+              <a:t>Infrastructure as code (</a:t>
+            </a:r>
+            <a:r>
+              <a:rPr lang="en-US" dirty="0" err="1"/>
+              <a:t>IaC</a:t>
+            </a:r>
+            <a:r>
+              <a:rPr lang="en-US" dirty="0"/>
+              <a:t>)</a:t>
+            </a:r>
+          </a:p>
+          <a:p>
+            <a:r>
+              <a:rPr lang="en-US" dirty="0"/>
+              <a:t>DevOps is the merging of the roles of Dev and Ops</a:t>
+            </a:r>
+          </a:p>
+          <a:p>
+            <a:pPr lvl="1"/>
+            <a:r>
+              <a:rPr lang="en-US" dirty="0"/>
+              <a:t>Developers write code, Ops now write code</a:t>
+            </a:r>
+          </a:p>
+          <a:p>
+            <a:pPr lvl="1"/>
+            <a:r>
+              <a:rPr lang="en-US" dirty="0"/>
+              <a:t>DevOps integrates the two roles through common tools</a:t>
+            </a:r>
+          </a:p>
+          <a:p>
+            <a:pPr lvl="1"/>
+            <a:r>
+              <a:rPr lang="en-US" dirty="0"/>
+              <a:t>Enables </a:t>
+            </a:r>
+            <a:r>
+              <a:rPr lang="en-US" i="1" dirty="0"/>
+              <a:t>continuous integration </a:t>
+            </a:r>
+            <a:r>
+              <a:rPr lang="en-US" dirty="0"/>
+              <a:t>and </a:t>
+            </a:r>
+            <a:r>
+              <a:rPr lang="en-US" i="1" dirty="0"/>
+              <a:t>continuous deployment </a:t>
+            </a:r>
+            <a:r>
+              <a:rPr lang="en-US" dirty="0"/>
+              <a:t>(CICD)</a:t>
+            </a:r>
+            <a:endParaRPr lang="en-CA" dirty="0"/>
+          </a:p>
+        </p:txBody>
+      </p:sp>
+      <p:sp>
+        <p:nvSpPr>
+          <p:cNvPr id="4" name="Footer Placeholder 3">
+            <a:extLst>
+              <a:ext uri="{FF2B5EF4-FFF2-40B4-BE49-F238E27FC236}">
+                <a16:creationId xmlns:a16="http://schemas.microsoft.com/office/drawing/2014/main" id="{B504FD45-F9DB-4E2B-945B-B23C464C5BA5}"/>
+              </a:ext>
+            </a:extLst>
+          </p:cNvPr>
+          <p:cNvSpPr>
+            <a:spLocks noGrp="1"/>
+          </p:cNvSpPr>
+          <p:nvPr>
+            <p:ph type="ftr" sz="quarter" idx="11"/>
+          </p:nvPr>
+        </p:nvSpPr>
+        <p:spPr/>
+        <p:txBody>
+          <a:bodyPr/>
+          <a:lstStyle/>
+          <a:p>
+            <a:pPr algn="l">
+              <a:defRPr/>
+            </a:pPr>
+            <a:r>
+              <a:rPr lang="en-US"/>
+              <a:t>Copyright © 2021 Elephant Scale. All rights reserved.</a:t>
+            </a:r>
+            <a:endParaRPr lang="en-US" dirty="0"/>
+          </a:p>
+        </p:txBody>
+      </p:sp>
+      <p:sp>
+        <p:nvSpPr>
+          <p:cNvPr id="5" name="Slide Number Placeholder 4">
+            <a:extLst>
+              <a:ext uri="{FF2B5EF4-FFF2-40B4-BE49-F238E27FC236}">
+                <a16:creationId xmlns:a16="http://schemas.microsoft.com/office/drawing/2014/main" id="{D8A61E34-1BA4-4BC6-9575-3D588F707E71}"/>
+              </a:ext>
+            </a:extLst>
+          </p:cNvPr>
+          <p:cNvSpPr>
+            <a:spLocks noGrp="1"/>
+          </p:cNvSpPr>
+          <p:nvPr>
+            <p:ph type="sldNum" sz="quarter" idx="12"/>
+          </p:nvPr>
+        </p:nvSpPr>
+        <p:spPr/>
+        <p:txBody>
+          <a:bodyPr/>
+          <a:lstStyle/>
+          <a:p>
+            <a:pPr>
+              <a:defRPr/>
+            </a:pPr>
+            <a:fld id="{77EF9825-4C23-4085-A4E3-B5565466BD91}" type="slidenum">
+              <a:rPr lang="en-US" smtClean="0"/>
+              <a:pPr>
+                <a:defRPr/>
+              </a:pPr>
+              <a:t>31</a:t>
+            </a:fld>
+            <a:endParaRPr lang="en-US" dirty="0"/>
+          </a:p>
+        </p:txBody>
+      </p:sp>
+      <p:pic>
+        <p:nvPicPr>
+          <p:cNvPr id="7" name="Picture 6" descr="A group of colorful balloons&#10;&#10;Description automatically generated with medium confidence">
+            <a:extLst>
+              <a:ext uri="{FF2B5EF4-FFF2-40B4-BE49-F238E27FC236}">
+                <a16:creationId xmlns:a16="http://schemas.microsoft.com/office/drawing/2014/main" id="{7112E644-7198-4C60-894F-7CD97D344C54}"/>
+              </a:ext>
+            </a:extLst>
+          </p:cNvPr>
+          <p:cNvPicPr>
+            <a:picLocks noChangeAspect="1"/>
+          </p:cNvPicPr>
+          <p:nvPr/>
+        </p:nvPicPr>
+        <p:blipFill>
+          <a:blip r:embed="rId2"/>
+          <a:stretch>
+            <a:fillRect/>
+          </a:stretch>
+        </p:blipFill>
+        <p:spPr>
+          <a:xfrm>
+            <a:off x="2400300" y="4910931"/>
+            <a:ext cx="3924300" cy="2223770"/>
+          </a:xfrm>
+          <a:prstGeom prst="rect">
+            <a:avLst/>
+          </a:prstGeom>
+        </p:spPr>
+      </p:pic>
+    </p:spTree>
+    <p:extLst>
+      <p:ext uri="{BB962C8B-B14F-4D97-AF65-F5344CB8AC3E}">
+        <p14:creationId xmlns:p14="http://schemas.microsoft.com/office/powerpoint/2010/main" val="1384885502"/>
+      </p:ext>
+    </p:extLst>
+  </p:cSld>
+  <p:clrMapOvr>
+    <a:masterClrMapping/>
+  </p:clrMapOvr>
+</p:sld>
+</file>
+
+<file path=ppt/slides/slide32.xml><?xml version="1.0" encoding="utf-8"?>
+<p:sld xmlns:a="http://schemas.openxmlformats.org/drawingml/2006/main" xmlns:r="http://schemas.openxmlformats.org/officeDocument/2006/relationships" xmlns:p="http://schemas.openxmlformats.org/presentationml/2006/main">
+  <p:cSld>
+    <p:spTree>
+      <p:nvGrpSpPr>
+        <p:cNvPr id="1" name=""/>
+        <p:cNvGrpSpPr/>
+        <p:nvPr/>
+      </p:nvGrpSpPr>
+      <p:grpSpPr>
+        <a:xfrm>
+          <a:off x="0" y="0"/>
+          <a:ext cx="0" cy="0"/>
+          <a:chOff x="0" y="0"/>
+          <a:chExt cx="0" cy="0"/>
+        </a:xfrm>
+      </p:grpSpPr>
+      <p:sp>
+        <p:nvSpPr>
+          <p:cNvPr id="2" name="Title 1">
+            <a:extLst>
+              <a:ext uri="{FF2B5EF4-FFF2-40B4-BE49-F238E27FC236}">
+                <a16:creationId xmlns:a16="http://schemas.microsoft.com/office/drawing/2014/main" id="{6AAF2A14-0034-4725-AC75-374E28CB29B2}"/>
+              </a:ext>
+            </a:extLst>
+          </p:cNvPr>
+          <p:cNvSpPr>
+            <a:spLocks noGrp="1"/>
+          </p:cNvSpPr>
+          <p:nvPr>
+            <p:ph type="title"/>
+          </p:nvPr>
+        </p:nvSpPr>
+        <p:spPr/>
+        <p:txBody>
+          <a:bodyPr/>
+          <a:lstStyle/>
+          <a:p>
+            <a:r>
+              <a:rPr lang="en-US" dirty="0"/>
+              <a:t>Why </a:t>
+            </a:r>
+            <a:r>
+              <a:rPr lang="en-US" dirty="0" err="1"/>
+              <a:t>IaC</a:t>
+            </a:r>
+            <a:r>
+              <a:rPr lang="en-US" dirty="0"/>
+              <a:t>?</a:t>
+            </a:r>
+            <a:endParaRPr lang="en-CA" dirty="0"/>
+          </a:p>
+        </p:txBody>
+      </p:sp>
+      <p:sp>
+        <p:nvSpPr>
+          <p:cNvPr id="3" name="Content Placeholder 2">
+            <a:extLst>
+              <a:ext uri="{FF2B5EF4-FFF2-40B4-BE49-F238E27FC236}">
+                <a16:creationId xmlns:a16="http://schemas.microsoft.com/office/drawing/2014/main" id="{3A0CC403-BAE5-46D7-9CD5-193BD7CBA7AD}"/>
+              </a:ext>
+            </a:extLst>
+          </p:cNvPr>
+          <p:cNvSpPr>
+            <a:spLocks noGrp="1"/>
+          </p:cNvSpPr>
+          <p:nvPr>
+            <p:ph idx="1"/>
+          </p:nvPr>
+        </p:nvSpPr>
+        <p:spPr/>
+        <p:txBody>
+          <a:bodyPr>
+            <a:normAutofit/>
+          </a:bodyPr>
+          <a:lstStyle/>
+          <a:p>
+            <a:r>
+              <a:rPr lang="en-US" dirty="0"/>
+              <a:t>Speed and simplicity</a:t>
+            </a:r>
+          </a:p>
+          <a:p>
+            <a:pPr lvl="1"/>
+            <a:r>
+              <a:rPr lang="en-US" dirty="0"/>
+              <a:t>Entire deployments can be set up or torn down by running a script</a:t>
+            </a:r>
+          </a:p>
+          <a:p>
+            <a:pPr lvl="1"/>
+            <a:r>
+              <a:rPr lang="en-US" dirty="0"/>
+              <a:t>Configuration consistency</a:t>
+            </a:r>
+          </a:p>
+          <a:p>
+            <a:pPr lvl="1"/>
+            <a:r>
+              <a:rPr lang="en-US" dirty="0"/>
+              <a:t>Identical copies of configurations can be created for testing or development</a:t>
+            </a:r>
+          </a:p>
+          <a:p>
+            <a:r>
+              <a:rPr lang="en-US" dirty="0"/>
+              <a:t>Minimization of risk</a:t>
+            </a:r>
+          </a:p>
+          <a:p>
+            <a:pPr lvl="1"/>
+            <a:r>
+              <a:rPr lang="en-US" dirty="0"/>
+              <a:t>Reduces human procedural errors</a:t>
+            </a:r>
+          </a:p>
+          <a:p>
+            <a:pPr lvl="1"/>
+            <a:r>
+              <a:rPr lang="en-US" dirty="0"/>
+              <a:t>Allows for testing, reviews and other quality measures</a:t>
+            </a:r>
+          </a:p>
+          <a:p>
+            <a:r>
+              <a:rPr lang="en-US" dirty="0"/>
+              <a:t>Increased efficiency in development</a:t>
+            </a:r>
+          </a:p>
+          <a:p>
+            <a:pPr lvl="1"/>
+            <a:r>
+              <a:rPr lang="en-US" dirty="0"/>
+              <a:t>Infrastructure code is not a bottleneck</a:t>
+            </a:r>
+          </a:p>
+          <a:p>
+            <a:pPr lvl="1"/>
+            <a:r>
+              <a:rPr lang="en-US" dirty="0"/>
+              <a:t>Allows for more efficient development and operations management</a:t>
+            </a:r>
+          </a:p>
+          <a:p>
+            <a:r>
+              <a:rPr lang="en-US" dirty="0"/>
+              <a:t>Supported by main IoT development and operations platforms</a:t>
+            </a:r>
+          </a:p>
+          <a:p>
+            <a:pPr lvl="1"/>
+            <a:r>
+              <a:rPr lang="en-US" dirty="0"/>
+              <a:t>Cloud IoT development environments</a:t>
+            </a:r>
+          </a:p>
+          <a:p>
+            <a:pPr lvl="1"/>
+            <a:r>
+              <a:rPr lang="en-US" dirty="0" err="1"/>
+              <a:t>IioT</a:t>
+            </a:r>
+            <a:r>
+              <a:rPr lang="en-US" dirty="0"/>
+              <a:t> development tools (e.g. IBM Engineering Lifecycle)</a:t>
+            </a:r>
+            <a:endParaRPr lang="en-CA" dirty="0"/>
+          </a:p>
+        </p:txBody>
+      </p:sp>
+      <p:sp>
+        <p:nvSpPr>
+          <p:cNvPr id="4" name="Footer Placeholder 3">
+            <a:extLst>
+              <a:ext uri="{FF2B5EF4-FFF2-40B4-BE49-F238E27FC236}">
+                <a16:creationId xmlns:a16="http://schemas.microsoft.com/office/drawing/2014/main" id="{11453D76-3D26-4ADC-9A5D-1DEDE964B70C}"/>
+              </a:ext>
+            </a:extLst>
+          </p:cNvPr>
+          <p:cNvSpPr>
+            <a:spLocks noGrp="1"/>
+          </p:cNvSpPr>
+          <p:nvPr>
+            <p:ph type="ftr" sz="quarter" idx="11"/>
+          </p:nvPr>
+        </p:nvSpPr>
+        <p:spPr/>
+        <p:txBody>
+          <a:bodyPr/>
+          <a:lstStyle/>
+          <a:p>
+            <a:pPr algn="l">
+              <a:defRPr/>
+            </a:pPr>
+            <a:r>
+              <a:rPr lang="en-US"/>
+              <a:t>Copyright © 2021 Elephant Scale. All rights reserved.</a:t>
+            </a:r>
+            <a:endParaRPr lang="en-US" dirty="0"/>
+          </a:p>
+        </p:txBody>
+      </p:sp>
+      <p:sp>
+        <p:nvSpPr>
+          <p:cNvPr id="5" name="Slide Number Placeholder 4">
+            <a:extLst>
+              <a:ext uri="{FF2B5EF4-FFF2-40B4-BE49-F238E27FC236}">
+                <a16:creationId xmlns:a16="http://schemas.microsoft.com/office/drawing/2014/main" id="{B49671EE-122E-4AB8-9021-F5BE714C2421}"/>
+              </a:ext>
+            </a:extLst>
+          </p:cNvPr>
+          <p:cNvSpPr>
+            <a:spLocks noGrp="1"/>
+          </p:cNvSpPr>
+          <p:nvPr>
+            <p:ph type="sldNum" sz="quarter" idx="12"/>
+          </p:nvPr>
+        </p:nvSpPr>
+        <p:spPr/>
+        <p:txBody>
+          <a:bodyPr/>
+          <a:lstStyle/>
+          <a:p>
+            <a:pPr>
+              <a:defRPr/>
+            </a:pPr>
+            <a:fld id="{77EF9825-4C23-4085-A4E3-B5565466BD91}" type="slidenum">
+              <a:rPr lang="en-US" smtClean="0"/>
+              <a:pPr>
+                <a:defRPr/>
+              </a:pPr>
+              <a:t>32</a:t>
+            </a:fld>
+            <a:endParaRPr lang="en-US" dirty="0"/>
+          </a:p>
+        </p:txBody>
+      </p:sp>
+    </p:spTree>
+    <p:extLst>
+      <p:ext uri="{BB962C8B-B14F-4D97-AF65-F5344CB8AC3E}">
+        <p14:creationId xmlns:p14="http://schemas.microsoft.com/office/powerpoint/2010/main" val="4142478682"/>
+      </p:ext>
+    </p:extLst>
+  </p:cSld>
+  <p:clrMapOvr>
+    <a:masterClrMapping/>
+  </p:clrMapOvr>
+</p:sld>
+</file>
+
+<file path=ppt/slides/slide33.xml><?xml version="1.0" encoding="utf-8"?>
+<p:sld xmlns:a="http://schemas.openxmlformats.org/drawingml/2006/main" xmlns:r="http://schemas.openxmlformats.org/officeDocument/2006/relationships" xmlns:p="http://schemas.openxmlformats.org/presentationml/2006/main">
+  <p:cSld>
+    <p:spTree>
+      <p:nvGrpSpPr>
+        <p:cNvPr id="1" name=""/>
+        <p:cNvGrpSpPr/>
+        <p:nvPr/>
+      </p:nvGrpSpPr>
+      <p:grpSpPr>
+        <a:xfrm>
+          <a:off x="0" y="0"/>
+          <a:ext cx="0" cy="0"/>
+          <a:chOff x="0" y="0"/>
+          <a:chExt cx="0" cy="0"/>
+        </a:xfrm>
+      </p:grpSpPr>
+      <p:sp>
+        <p:nvSpPr>
+          <p:cNvPr id="2" name="Title 1">
+            <a:extLst>
+              <a:ext uri="{FF2B5EF4-FFF2-40B4-BE49-F238E27FC236}">
+                <a16:creationId xmlns:a16="http://schemas.microsoft.com/office/drawing/2014/main" id="{6AAF2A14-0034-4725-AC75-374E28CB29B2}"/>
+              </a:ext>
+            </a:extLst>
+          </p:cNvPr>
+          <p:cNvSpPr>
+            <a:spLocks noGrp="1"/>
+          </p:cNvSpPr>
+          <p:nvPr>
+            <p:ph type="title"/>
+          </p:nvPr>
+        </p:nvSpPr>
+        <p:spPr/>
+        <p:txBody>
+          <a:bodyPr/>
+          <a:lstStyle/>
+          <a:p>
+            <a:r>
+              <a:rPr lang="en-US" dirty="0"/>
+              <a:t>Why </a:t>
+            </a:r>
+            <a:r>
+              <a:rPr lang="en-US" dirty="0" err="1"/>
+              <a:t>IaC</a:t>
+            </a:r>
+            <a:r>
+              <a:rPr lang="en-US" dirty="0"/>
+              <a:t>?</a:t>
+            </a:r>
+            <a:endParaRPr lang="en-CA" dirty="0"/>
+          </a:p>
+        </p:txBody>
+      </p:sp>
+      <p:sp>
+        <p:nvSpPr>
+          <p:cNvPr id="3" name="Content Placeholder 2">
+            <a:extLst>
+              <a:ext uri="{FF2B5EF4-FFF2-40B4-BE49-F238E27FC236}">
+                <a16:creationId xmlns:a16="http://schemas.microsoft.com/office/drawing/2014/main" id="{3A0CC403-BAE5-46D7-9CD5-193BD7CBA7AD}"/>
+              </a:ext>
+            </a:extLst>
+          </p:cNvPr>
+          <p:cNvSpPr>
+            <a:spLocks noGrp="1"/>
+          </p:cNvSpPr>
+          <p:nvPr>
+            <p:ph idx="1"/>
+          </p:nvPr>
+        </p:nvSpPr>
+        <p:spPr/>
+        <p:txBody>
+          <a:bodyPr>
+            <a:normAutofit/>
+          </a:bodyPr>
+          <a:lstStyle/>
+          <a:p>
+            <a:r>
+              <a:rPr lang="en-US" dirty="0"/>
+              <a:t>Self-service</a:t>
+            </a:r>
+          </a:p>
+          <a:p>
+            <a:pPr lvl="1"/>
+            <a:r>
+              <a:rPr lang="en-US" dirty="0"/>
+              <a:t>Infrastructure deployment with scripts does not rely on an administrator</a:t>
+            </a:r>
+          </a:p>
+          <a:p>
+            <a:pPr lvl="1"/>
+            <a:r>
+              <a:rPr lang="en-US" dirty="0"/>
+              <a:t>Speed and safety</a:t>
+            </a:r>
+          </a:p>
+          <a:p>
+            <a:pPr lvl="1"/>
+            <a:r>
+              <a:rPr lang="en-US" dirty="0"/>
+              <a:t>Infrastructure is deployment and updated faster and with fewer errors</a:t>
+            </a:r>
+          </a:p>
+          <a:p>
+            <a:r>
+              <a:rPr lang="en-US" dirty="0"/>
+              <a:t>Documentation</a:t>
+            </a:r>
+          </a:p>
+          <a:p>
+            <a:pPr lvl="1"/>
+            <a:r>
+              <a:rPr lang="en-US" dirty="0"/>
+              <a:t>The </a:t>
+            </a:r>
+            <a:r>
+              <a:rPr lang="en-US" dirty="0" err="1"/>
+              <a:t>IaC</a:t>
+            </a:r>
+            <a:r>
+              <a:rPr lang="en-US" dirty="0"/>
+              <a:t> source files </a:t>
+            </a:r>
+            <a:r>
+              <a:rPr lang="en-US" i="1" dirty="0"/>
+              <a:t>are</a:t>
+            </a:r>
+            <a:r>
+              <a:rPr lang="en-US" dirty="0"/>
+              <a:t> infrastructure documentation</a:t>
+            </a:r>
+          </a:p>
+          <a:p>
+            <a:r>
+              <a:rPr lang="en-US" dirty="0"/>
+              <a:t>Version control</a:t>
+            </a:r>
+          </a:p>
+          <a:p>
+            <a:pPr lvl="1"/>
+            <a:r>
+              <a:rPr lang="en-US" dirty="0"/>
+              <a:t>Previous deployments can be maintained in source control for regression or audit need, or to satisfy regulatory requirements</a:t>
+            </a:r>
+          </a:p>
+          <a:p>
+            <a:r>
+              <a:rPr lang="en-US" dirty="0"/>
+              <a:t>Validation</a:t>
+            </a:r>
+          </a:p>
+          <a:p>
+            <a:pPr lvl="1"/>
+            <a:r>
+              <a:rPr lang="en-US" dirty="0"/>
+              <a:t>For every single change, code reviews and dynamic testing can be performed</a:t>
+            </a:r>
+          </a:p>
+          <a:p>
+            <a:r>
+              <a:rPr lang="en-US" dirty="0"/>
+              <a:t>Reuse</a:t>
+            </a:r>
+          </a:p>
+          <a:p>
+            <a:pPr lvl="1"/>
+            <a:r>
+              <a:rPr lang="en-US" dirty="0"/>
+              <a:t>New infrastructure deployments can be derived quickly from previous deployments</a:t>
+            </a:r>
+          </a:p>
+          <a:p>
+            <a:endParaRPr lang="en-CA" dirty="0"/>
+          </a:p>
+        </p:txBody>
+      </p:sp>
+      <p:sp>
+        <p:nvSpPr>
+          <p:cNvPr id="4" name="Footer Placeholder 3">
+            <a:extLst>
+              <a:ext uri="{FF2B5EF4-FFF2-40B4-BE49-F238E27FC236}">
+                <a16:creationId xmlns:a16="http://schemas.microsoft.com/office/drawing/2014/main" id="{11453D76-3D26-4ADC-9A5D-1DEDE964B70C}"/>
+              </a:ext>
+            </a:extLst>
+          </p:cNvPr>
+          <p:cNvSpPr>
+            <a:spLocks noGrp="1"/>
+          </p:cNvSpPr>
+          <p:nvPr>
+            <p:ph type="ftr" sz="quarter" idx="11"/>
+          </p:nvPr>
+        </p:nvSpPr>
+        <p:spPr/>
+        <p:txBody>
+          <a:bodyPr/>
+          <a:lstStyle/>
+          <a:p>
+            <a:pPr algn="l">
+              <a:defRPr/>
+            </a:pPr>
+            <a:r>
+              <a:rPr lang="en-US"/>
+              <a:t>Copyright © 2021 Elephant Scale. All rights reserved.</a:t>
+            </a:r>
+            <a:endParaRPr lang="en-US" dirty="0"/>
+          </a:p>
+        </p:txBody>
+      </p:sp>
+      <p:sp>
+        <p:nvSpPr>
+          <p:cNvPr id="5" name="Slide Number Placeholder 4">
+            <a:extLst>
+              <a:ext uri="{FF2B5EF4-FFF2-40B4-BE49-F238E27FC236}">
+                <a16:creationId xmlns:a16="http://schemas.microsoft.com/office/drawing/2014/main" id="{B49671EE-122E-4AB8-9021-F5BE714C2421}"/>
+              </a:ext>
+            </a:extLst>
+          </p:cNvPr>
+          <p:cNvSpPr>
+            <a:spLocks noGrp="1"/>
+          </p:cNvSpPr>
+          <p:nvPr>
+            <p:ph type="sldNum" sz="quarter" idx="12"/>
+          </p:nvPr>
+        </p:nvSpPr>
+        <p:spPr/>
+        <p:txBody>
+          <a:bodyPr/>
+          <a:lstStyle/>
+          <a:p>
+            <a:pPr>
+              <a:defRPr/>
+            </a:pPr>
+            <a:fld id="{77EF9825-4C23-4085-A4E3-B5565466BD91}" type="slidenum">
+              <a:rPr lang="en-US" smtClean="0"/>
+              <a:pPr>
+                <a:defRPr/>
+              </a:pPr>
+              <a:t>33</a:t>
+            </a:fld>
+            <a:endParaRPr lang="en-US" dirty="0"/>
+          </a:p>
+        </p:txBody>
+      </p:sp>
+    </p:spTree>
+    <p:extLst>
+      <p:ext uri="{BB962C8B-B14F-4D97-AF65-F5344CB8AC3E}">
+        <p14:creationId xmlns:p14="http://schemas.microsoft.com/office/powerpoint/2010/main" val="1864156659"/>
+      </p:ext>
+    </p:extLst>
+  </p:cSld>
+  <p:clrMapOvr>
+    <a:masterClrMapping/>
+  </p:clrMapOvr>
+</p:sld>
+</file>
+
+<file path=ppt/slides/slide34.xml><?xml version="1.0" encoding="utf-8"?>
+<p:sld xmlns:a="http://schemas.openxmlformats.org/drawingml/2006/main" xmlns:r="http://schemas.openxmlformats.org/officeDocument/2006/relationships" xmlns:p="http://schemas.openxmlformats.org/presentationml/2006/main">
+  <p:cSld>
+    <p:spTree>
+      <p:nvGrpSpPr>
+        <p:cNvPr id="1" name=""/>
+        <p:cNvGrpSpPr/>
+        <p:nvPr/>
+      </p:nvGrpSpPr>
+      <p:grpSpPr>
+        <a:xfrm>
+          <a:off x="0" y="0"/>
+          <a:ext cx="0" cy="0"/>
+          <a:chOff x="0" y="0"/>
+          <a:chExt cx="0" cy="0"/>
+        </a:xfrm>
+      </p:grpSpPr>
+      <p:sp>
+        <p:nvSpPr>
+          <p:cNvPr id="2" name="Title 1">
+            <a:extLst>
+              <a:ext uri="{FF2B5EF4-FFF2-40B4-BE49-F238E27FC236}">
+                <a16:creationId xmlns:a16="http://schemas.microsoft.com/office/drawing/2014/main" id="{6BE59AB3-DA8B-4A6B-8A45-0FE58F84364A}"/>
+              </a:ext>
+            </a:extLst>
+          </p:cNvPr>
+          <p:cNvSpPr>
+            <a:spLocks noGrp="1"/>
+          </p:cNvSpPr>
+          <p:nvPr>
+            <p:ph type="title"/>
+          </p:nvPr>
+        </p:nvSpPr>
+        <p:spPr/>
+        <p:txBody>
+          <a:bodyPr/>
+          <a:lstStyle/>
+          <a:p>
+            <a:r>
+              <a:rPr lang="en-US" dirty="0" err="1"/>
+              <a:t>DevSecOps</a:t>
+            </a:r>
+            <a:endParaRPr lang="en-CA" dirty="0"/>
+          </a:p>
+        </p:txBody>
+      </p:sp>
+      <p:sp>
+        <p:nvSpPr>
+          <p:cNvPr id="3" name="Content Placeholder 2">
+            <a:extLst>
+              <a:ext uri="{FF2B5EF4-FFF2-40B4-BE49-F238E27FC236}">
+                <a16:creationId xmlns:a16="http://schemas.microsoft.com/office/drawing/2014/main" id="{6CD95F83-185A-41E0-8051-C57179070D25}"/>
+              </a:ext>
+            </a:extLst>
+          </p:cNvPr>
+          <p:cNvSpPr>
+            <a:spLocks noGrp="1"/>
+          </p:cNvSpPr>
+          <p:nvPr>
+            <p:ph idx="1"/>
+          </p:nvPr>
+        </p:nvSpPr>
+        <p:spPr>
+          <a:xfrm>
+            <a:off x="234950" y="994976"/>
+            <a:ext cx="8902700" cy="1171972"/>
+          </a:xfrm>
+        </p:spPr>
+        <p:txBody>
+          <a:bodyPr/>
+          <a:lstStyle/>
+          <a:p>
+            <a:r>
+              <a:rPr lang="en-US" dirty="0"/>
+              <a:t>Automatically bakes in security at every phase of the software development lifecycle</a:t>
+            </a:r>
+          </a:p>
+          <a:p>
+            <a:endParaRPr lang="en-CA" dirty="0"/>
+          </a:p>
+        </p:txBody>
+      </p:sp>
+      <p:sp>
+        <p:nvSpPr>
+          <p:cNvPr id="4" name="Footer Placeholder 3">
+            <a:extLst>
+              <a:ext uri="{FF2B5EF4-FFF2-40B4-BE49-F238E27FC236}">
+                <a16:creationId xmlns:a16="http://schemas.microsoft.com/office/drawing/2014/main" id="{A27400C3-FEC9-4379-91FE-B7179650CE52}"/>
+              </a:ext>
+            </a:extLst>
+          </p:cNvPr>
+          <p:cNvSpPr>
+            <a:spLocks noGrp="1"/>
+          </p:cNvSpPr>
+          <p:nvPr>
+            <p:ph type="ftr" sz="quarter" idx="11"/>
+          </p:nvPr>
+        </p:nvSpPr>
+        <p:spPr/>
+        <p:txBody>
+          <a:bodyPr/>
+          <a:lstStyle/>
+          <a:p>
+            <a:pPr algn="l">
+              <a:defRPr/>
+            </a:pPr>
+            <a:r>
+              <a:rPr lang="en-US"/>
+              <a:t>Copyright © 2021 Elephant Scale. All rights reserved.</a:t>
+            </a:r>
+            <a:endParaRPr lang="en-US" dirty="0"/>
+          </a:p>
+        </p:txBody>
+      </p:sp>
+      <p:sp>
+        <p:nvSpPr>
+          <p:cNvPr id="5" name="Slide Number Placeholder 4">
+            <a:extLst>
+              <a:ext uri="{FF2B5EF4-FFF2-40B4-BE49-F238E27FC236}">
+                <a16:creationId xmlns:a16="http://schemas.microsoft.com/office/drawing/2014/main" id="{797DEB59-48FE-475E-909B-3C1A8D1BDA88}"/>
+              </a:ext>
+            </a:extLst>
+          </p:cNvPr>
+          <p:cNvSpPr>
+            <a:spLocks noGrp="1"/>
+          </p:cNvSpPr>
+          <p:nvPr>
+            <p:ph type="sldNum" sz="quarter" idx="12"/>
+          </p:nvPr>
+        </p:nvSpPr>
+        <p:spPr/>
+        <p:txBody>
+          <a:bodyPr/>
+          <a:lstStyle/>
+          <a:p>
+            <a:pPr>
+              <a:defRPr/>
+            </a:pPr>
+            <a:fld id="{77EF9825-4C23-4085-A4E3-B5565466BD91}" type="slidenum">
+              <a:rPr lang="en-US" smtClean="0"/>
+              <a:pPr>
+                <a:defRPr/>
+              </a:pPr>
+              <a:t>34</a:t>
+            </a:fld>
+            <a:endParaRPr lang="en-US" dirty="0"/>
+          </a:p>
+        </p:txBody>
+      </p:sp>
+      <p:pic>
+        <p:nvPicPr>
+          <p:cNvPr id="6" name="Picture 5">
+            <a:extLst>
+              <a:ext uri="{FF2B5EF4-FFF2-40B4-BE49-F238E27FC236}">
+                <a16:creationId xmlns:a16="http://schemas.microsoft.com/office/drawing/2014/main" id="{267F1487-84E7-4FCA-8C92-612052F75506}"/>
+              </a:ext>
+            </a:extLst>
+          </p:cNvPr>
+          <p:cNvPicPr>
+            <a:picLocks noChangeAspect="1"/>
+          </p:cNvPicPr>
+          <p:nvPr/>
+        </p:nvPicPr>
+        <p:blipFill>
+          <a:blip r:embed="rId3"/>
+          <a:stretch>
+            <a:fillRect/>
+          </a:stretch>
+        </p:blipFill>
+        <p:spPr>
+          <a:xfrm>
+            <a:off x="699407" y="2519071"/>
+            <a:ext cx="7734300" cy="3619256"/>
+          </a:xfrm>
+          <a:prstGeom prst="rect">
+            <a:avLst/>
+          </a:prstGeom>
+        </p:spPr>
+      </p:pic>
+      <p:sp>
+        <p:nvSpPr>
+          <p:cNvPr id="7" name="TextBox 6">
+            <a:extLst>
+              <a:ext uri="{FF2B5EF4-FFF2-40B4-BE49-F238E27FC236}">
+                <a16:creationId xmlns:a16="http://schemas.microsoft.com/office/drawing/2014/main" id="{ECD223DB-85E8-4A95-B428-373F94668A0D}"/>
+              </a:ext>
+            </a:extLst>
+          </p:cNvPr>
+          <p:cNvSpPr txBox="1"/>
+          <p:nvPr/>
+        </p:nvSpPr>
+        <p:spPr>
+          <a:xfrm>
+            <a:off x="1168853" y="6730563"/>
+            <a:ext cx="7034893" cy="738664"/>
+          </a:xfrm>
+          <a:prstGeom prst="rect">
+            <a:avLst/>
+          </a:prstGeom>
+          <a:noFill/>
+        </p:spPr>
+        <p:txBody>
+          <a:bodyPr wrap="square" rtlCol="0">
+            <a:spAutoFit/>
+          </a:bodyPr>
+          <a:lstStyle/>
+          <a:p>
+            <a:pPr algn="ctr"/>
+            <a:r>
+              <a:rPr lang="en-US" sz="1400" i="1" dirty="0">
+                <a:solidFill>
+                  <a:schemeClr val="bg2"/>
+                </a:solidFill>
+              </a:rPr>
+              <a:t>“The purpose and intent of </a:t>
+            </a:r>
+            <a:r>
+              <a:rPr lang="en-US" sz="1400" i="1" dirty="0" err="1">
+                <a:solidFill>
+                  <a:schemeClr val="bg2"/>
+                </a:solidFill>
+              </a:rPr>
+              <a:t>DevSecOps</a:t>
+            </a:r>
+            <a:r>
+              <a:rPr lang="en-US" sz="1400" i="1" dirty="0">
+                <a:solidFill>
+                  <a:schemeClr val="bg2"/>
+                </a:solidFill>
+              </a:rPr>
+              <a:t> is to build on the mindset that everyone is responsible for security with the goal of safely distributing security decisions at speed and scale to those who hold the highest level of context without sacrificing the safety required,” describes Shannon </a:t>
+            </a:r>
+            <a:r>
+              <a:rPr lang="en-US" sz="1400" i="1" dirty="0" err="1">
+                <a:solidFill>
+                  <a:schemeClr val="bg2"/>
+                </a:solidFill>
+              </a:rPr>
+              <a:t>Lietz</a:t>
+            </a:r>
+            <a:r>
+              <a:rPr lang="en-US" sz="1400" i="1" dirty="0">
+                <a:solidFill>
+                  <a:schemeClr val="bg2"/>
+                </a:solidFill>
+              </a:rPr>
+              <a:t>, co-author of the “</a:t>
+            </a:r>
+            <a:r>
+              <a:rPr lang="en-US" sz="1400" i="1" dirty="0" err="1">
+                <a:solidFill>
+                  <a:schemeClr val="bg2"/>
+                </a:solidFill>
+              </a:rPr>
+              <a:t>DevSecOps</a:t>
+            </a:r>
+            <a:r>
+              <a:rPr lang="en-US" sz="1400" i="1" dirty="0">
+                <a:solidFill>
+                  <a:schemeClr val="bg2"/>
+                </a:solidFill>
+              </a:rPr>
+              <a:t> Manifesto.”</a:t>
+            </a:r>
+            <a:endParaRPr lang="en-CA" sz="1400" i="1" dirty="0">
+              <a:solidFill>
+                <a:schemeClr val="bg2"/>
+              </a:solidFill>
+            </a:endParaRPr>
+          </a:p>
+        </p:txBody>
+      </p:sp>
+    </p:spTree>
+    <p:extLst>
+      <p:ext uri="{BB962C8B-B14F-4D97-AF65-F5344CB8AC3E}">
+        <p14:creationId xmlns:p14="http://schemas.microsoft.com/office/powerpoint/2010/main" val="499881022"/>
+      </p:ext>
+    </p:extLst>
+  </p:cSld>
+  <p:clrMapOvr>
+    <a:masterClrMapping/>
+  </p:clrMapOvr>
+</p:sld>
+</file>
+
+<file path=ppt/slides/slide35.xml><?xml version="1.0" encoding="utf-8"?>
+<p:sld xmlns:a="http://schemas.openxmlformats.org/drawingml/2006/main" xmlns:r="http://schemas.openxmlformats.org/officeDocument/2006/relationships" xmlns:p="http://schemas.openxmlformats.org/presentationml/2006/main">
+  <p:cSld>
+    <p:spTree>
+      <p:nvGrpSpPr>
+        <p:cNvPr id="1" name=""/>
+        <p:cNvGrpSpPr/>
+        <p:nvPr/>
+      </p:nvGrpSpPr>
+      <p:grpSpPr>
+        <a:xfrm>
+          <a:off x="0" y="0"/>
+          <a:ext cx="0" cy="0"/>
+          <a:chOff x="0" y="0"/>
+          <a:chExt cx="0" cy="0"/>
+        </a:xfrm>
+      </p:grpSpPr>
+      <p:sp>
+        <p:nvSpPr>
+          <p:cNvPr id="2" name="Title 1">
+            <a:extLst>
+              <a:ext uri="{FF2B5EF4-FFF2-40B4-BE49-F238E27FC236}">
+                <a16:creationId xmlns:a16="http://schemas.microsoft.com/office/drawing/2014/main" id="{6B311311-FAB3-48AB-81B7-B979E99663CF}"/>
+              </a:ext>
+            </a:extLst>
+          </p:cNvPr>
+          <p:cNvSpPr>
+            <a:spLocks noGrp="1"/>
+          </p:cNvSpPr>
+          <p:nvPr>
+            <p:ph type="title"/>
+          </p:nvPr>
+        </p:nvSpPr>
+        <p:spPr/>
+        <p:txBody>
+          <a:bodyPr/>
+          <a:lstStyle/>
+          <a:p>
+            <a:r>
+              <a:rPr lang="en-US" dirty="0" err="1"/>
+              <a:t>DevSecOps</a:t>
+            </a:r>
+            <a:r>
+              <a:rPr lang="en-US" dirty="0"/>
+              <a:t> Advantages</a:t>
+            </a:r>
+            <a:endParaRPr lang="en-CA" dirty="0"/>
+          </a:p>
+        </p:txBody>
+      </p:sp>
+      <p:sp>
+        <p:nvSpPr>
+          <p:cNvPr id="3" name="Content Placeholder 2">
+            <a:extLst>
+              <a:ext uri="{FF2B5EF4-FFF2-40B4-BE49-F238E27FC236}">
+                <a16:creationId xmlns:a16="http://schemas.microsoft.com/office/drawing/2014/main" id="{9FAEAFF9-9112-4853-BC22-97668E596BFA}"/>
+              </a:ext>
+            </a:extLst>
+          </p:cNvPr>
+          <p:cNvSpPr>
+            <a:spLocks noGrp="1"/>
+          </p:cNvSpPr>
+          <p:nvPr>
+            <p:ph idx="1"/>
+          </p:nvPr>
+        </p:nvSpPr>
+        <p:spPr/>
+        <p:txBody>
+          <a:bodyPr/>
+          <a:lstStyle/>
+          <a:p>
+            <a:r>
+              <a:rPr lang="en-CA" dirty="0"/>
+              <a:t>Rapid, cost-effective software delivery</a:t>
+            </a:r>
+          </a:p>
+          <a:p>
+            <a:pPr lvl="1"/>
+            <a:r>
+              <a:rPr lang="en-US" dirty="0"/>
+              <a:t>Security problems can lead to huge time delays</a:t>
+            </a:r>
+          </a:p>
+          <a:p>
+            <a:pPr lvl="1"/>
+            <a:r>
+              <a:rPr lang="en-US" dirty="0"/>
+              <a:t>Fixing security issues can be time-consuming and expensive The rapid</a:t>
+            </a:r>
+          </a:p>
+          <a:p>
+            <a:pPr lvl="1"/>
+            <a:r>
+              <a:rPr lang="en-US" dirty="0" err="1"/>
+              <a:t>DevSecOps</a:t>
+            </a:r>
+            <a:r>
+              <a:rPr lang="en-US" dirty="0"/>
+              <a:t> saves time and reduces costs by minimizing the need to repeat a process to address security issues after the fact</a:t>
+            </a:r>
+          </a:p>
+          <a:p>
+            <a:pPr lvl="1"/>
+            <a:r>
+              <a:rPr lang="en-US" dirty="0"/>
+              <a:t>Integrated security cuts out duplicative reviews and unnecessary rebuilds, resulting in more secure code</a:t>
+            </a:r>
+          </a:p>
+          <a:p>
+            <a:r>
+              <a:rPr lang="en-CA" dirty="0"/>
+              <a:t>Improved, proactive security</a:t>
+            </a:r>
+          </a:p>
+          <a:p>
+            <a:pPr lvl="1"/>
+            <a:r>
+              <a:rPr lang="en-US" dirty="0"/>
+              <a:t>Throughout development, code is reviewed, audited, scanned, and tested for security issues</a:t>
+            </a:r>
+          </a:p>
+          <a:p>
+            <a:pPr lvl="1"/>
+            <a:r>
+              <a:rPr lang="en-US" dirty="0"/>
+              <a:t>Security problems are fixed before additional dependencies are introduced</a:t>
+            </a:r>
+          </a:p>
+          <a:p>
+            <a:r>
+              <a:rPr lang="en-US" dirty="0"/>
+              <a:t>Compatible with modern development</a:t>
+            </a:r>
+          </a:p>
+          <a:p>
+            <a:pPr lvl="1"/>
+            <a:r>
+              <a:rPr lang="en-US" dirty="0"/>
+              <a:t>Cybersecurity testing can be integrated into an automated test suite for operations teams</a:t>
+            </a:r>
+          </a:p>
+          <a:p>
+            <a:pPr lvl="1"/>
+            <a:endParaRPr lang="en-CA" dirty="0"/>
+          </a:p>
+        </p:txBody>
+      </p:sp>
+      <p:sp>
+        <p:nvSpPr>
+          <p:cNvPr id="4" name="Footer Placeholder 3">
+            <a:extLst>
+              <a:ext uri="{FF2B5EF4-FFF2-40B4-BE49-F238E27FC236}">
+                <a16:creationId xmlns:a16="http://schemas.microsoft.com/office/drawing/2014/main" id="{B23AC0D2-728E-4BBF-849D-6BC734ABFFAA}"/>
+              </a:ext>
+            </a:extLst>
+          </p:cNvPr>
+          <p:cNvSpPr>
+            <a:spLocks noGrp="1"/>
+          </p:cNvSpPr>
+          <p:nvPr>
+            <p:ph type="ftr" sz="quarter" idx="11"/>
+          </p:nvPr>
+        </p:nvSpPr>
+        <p:spPr/>
+        <p:txBody>
+          <a:bodyPr/>
+          <a:lstStyle/>
+          <a:p>
+            <a:pPr algn="l">
+              <a:defRPr/>
+            </a:pPr>
+            <a:r>
+              <a:rPr lang="en-US"/>
+              <a:t>Copyright © 2021 Elephant Scale. All rights reserved.</a:t>
+            </a:r>
+            <a:endParaRPr lang="en-US" dirty="0"/>
+          </a:p>
+        </p:txBody>
+      </p:sp>
+      <p:sp>
+        <p:nvSpPr>
+          <p:cNvPr id="5" name="Slide Number Placeholder 4">
+            <a:extLst>
+              <a:ext uri="{FF2B5EF4-FFF2-40B4-BE49-F238E27FC236}">
+                <a16:creationId xmlns:a16="http://schemas.microsoft.com/office/drawing/2014/main" id="{9B50BE47-7801-495A-9416-DBB992676DC0}"/>
+              </a:ext>
+            </a:extLst>
+          </p:cNvPr>
+          <p:cNvSpPr>
+            <a:spLocks noGrp="1"/>
+          </p:cNvSpPr>
+          <p:nvPr>
+            <p:ph type="sldNum" sz="quarter" idx="12"/>
+          </p:nvPr>
+        </p:nvSpPr>
+        <p:spPr/>
+        <p:txBody>
+          <a:bodyPr/>
+          <a:lstStyle/>
+          <a:p>
+            <a:pPr>
+              <a:defRPr/>
+            </a:pPr>
+            <a:fld id="{77EF9825-4C23-4085-A4E3-B5565466BD91}" type="slidenum">
+              <a:rPr lang="en-US" smtClean="0"/>
+              <a:pPr>
+                <a:defRPr/>
+              </a:pPr>
+              <a:t>35</a:t>
+            </a:fld>
+            <a:endParaRPr lang="en-US" dirty="0"/>
+          </a:p>
+        </p:txBody>
+      </p:sp>
+    </p:spTree>
+    <p:extLst>
+      <p:ext uri="{BB962C8B-B14F-4D97-AF65-F5344CB8AC3E}">
+        <p14:creationId xmlns:p14="http://schemas.microsoft.com/office/powerpoint/2010/main" val="199255891"/>
+      </p:ext>
+    </p:extLst>
+  </p:cSld>
+  <p:clrMapOvr>
+    <a:masterClrMapping/>
+  </p:clrMapOvr>
+</p:sld>
+</file>
+
+<file path=ppt/slides/slide36.xml><?xml version="1.0" encoding="utf-8"?>
+<p:sld xmlns:a="http://schemas.openxmlformats.org/drawingml/2006/main" xmlns:r="http://schemas.openxmlformats.org/officeDocument/2006/relationships" xmlns:p="http://schemas.openxmlformats.org/presentationml/2006/main">
+  <p:cSld>
+    <p:spTree>
+      <p:nvGrpSpPr>
+        <p:cNvPr id="1" name=""/>
+        <p:cNvGrpSpPr/>
+        <p:nvPr/>
+      </p:nvGrpSpPr>
+      <p:grpSpPr>
+        <a:xfrm>
+          <a:off x="0" y="0"/>
+          <a:ext cx="0" cy="0"/>
+          <a:chOff x="0" y="0"/>
+          <a:chExt cx="0" cy="0"/>
+        </a:xfrm>
+      </p:grpSpPr>
+      <p:sp>
+        <p:nvSpPr>
+          <p:cNvPr id="2" name="Title 1">
+            <a:extLst>
+              <a:ext uri="{FF2B5EF4-FFF2-40B4-BE49-F238E27FC236}">
+                <a16:creationId xmlns:a16="http://schemas.microsoft.com/office/drawing/2014/main" id="{74248A32-62D4-47B6-8A08-F86B35BE7E1B}"/>
+              </a:ext>
+            </a:extLst>
+          </p:cNvPr>
+          <p:cNvSpPr>
+            <a:spLocks noGrp="1"/>
+          </p:cNvSpPr>
+          <p:nvPr>
+            <p:ph type="title"/>
+          </p:nvPr>
+        </p:nvSpPr>
+        <p:spPr/>
+        <p:txBody>
+          <a:bodyPr/>
+          <a:lstStyle/>
+          <a:p>
+            <a:r>
+              <a:rPr lang="en-CA" dirty="0" err="1"/>
+              <a:t>DevSecOps</a:t>
+            </a:r>
+            <a:r>
+              <a:rPr lang="en-CA" dirty="0"/>
+              <a:t> Advantages</a:t>
+            </a:r>
+          </a:p>
+        </p:txBody>
+      </p:sp>
+      <p:sp>
+        <p:nvSpPr>
+          <p:cNvPr id="3" name="Content Placeholder 2">
+            <a:extLst>
+              <a:ext uri="{FF2B5EF4-FFF2-40B4-BE49-F238E27FC236}">
+                <a16:creationId xmlns:a16="http://schemas.microsoft.com/office/drawing/2014/main" id="{6552F386-F9B6-4B90-A2E0-8A3813047BB8}"/>
+              </a:ext>
+            </a:extLst>
+          </p:cNvPr>
+          <p:cNvSpPr>
+            <a:spLocks noGrp="1"/>
+          </p:cNvSpPr>
+          <p:nvPr>
+            <p:ph idx="1"/>
+          </p:nvPr>
+        </p:nvSpPr>
+        <p:spPr/>
+        <p:txBody>
+          <a:bodyPr/>
+          <a:lstStyle/>
+          <a:p>
+            <a:r>
+              <a:rPr lang="en-CA" dirty="0"/>
+              <a:t>Repeatable and adaptive process</a:t>
+            </a:r>
+          </a:p>
+          <a:p>
+            <a:pPr lvl="1"/>
+            <a:r>
+              <a:rPr lang="en-US" dirty="0"/>
+              <a:t>Ensures security is applied consistently across the operational and development environment</a:t>
+            </a:r>
+          </a:p>
+          <a:p>
+            <a:pPr lvl="1"/>
+            <a:r>
+              <a:rPr lang="en-US" dirty="0"/>
+              <a:t>As the environment changes, security development adapts to new security requirements</a:t>
+            </a:r>
+          </a:p>
+          <a:p>
+            <a:pPr marL="404813" lvl="1" indent="0">
+              <a:buNone/>
+            </a:pPr>
+            <a:endParaRPr lang="en-CA" dirty="0"/>
+          </a:p>
+        </p:txBody>
+      </p:sp>
+      <p:sp>
+        <p:nvSpPr>
+          <p:cNvPr id="4" name="Footer Placeholder 3">
+            <a:extLst>
+              <a:ext uri="{FF2B5EF4-FFF2-40B4-BE49-F238E27FC236}">
+                <a16:creationId xmlns:a16="http://schemas.microsoft.com/office/drawing/2014/main" id="{57E0842C-CB3E-42A0-89F5-0D8D42CABA7C}"/>
+              </a:ext>
+            </a:extLst>
+          </p:cNvPr>
+          <p:cNvSpPr>
+            <a:spLocks noGrp="1"/>
+          </p:cNvSpPr>
+          <p:nvPr>
+            <p:ph type="ftr" sz="quarter" idx="11"/>
+          </p:nvPr>
+        </p:nvSpPr>
+        <p:spPr/>
+        <p:txBody>
+          <a:bodyPr/>
+          <a:lstStyle/>
+          <a:p>
+            <a:pPr algn="l">
+              <a:defRPr/>
+            </a:pPr>
+            <a:r>
+              <a:rPr lang="en-US"/>
+              <a:t>Copyright © 2021 Elephant Scale. All rights reserved.</a:t>
+            </a:r>
+            <a:endParaRPr lang="en-US" dirty="0"/>
+          </a:p>
+        </p:txBody>
+      </p:sp>
+      <p:sp>
+        <p:nvSpPr>
+          <p:cNvPr id="5" name="Slide Number Placeholder 4">
+            <a:extLst>
+              <a:ext uri="{FF2B5EF4-FFF2-40B4-BE49-F238E27FC236}">
+                <a16:creationId xmlns:a16="http://schemas.microsoft.com/office/drawing/2014/main" id="{672D6B77-6171-461A-921F-8E779BA0048A}"/>
+              </a:ext>
+            </a:extLst>
+          </p:cNvPr>
+          <p:cNvSpPr>
+            <a:spLocks noGrp="1"/>
+          </p:cNvSpPr>
+          <p:nvPr>
+            <p:ph type="sldNum" sz="quarter" idx="12"/>
+          </p:nvPr>
+        </p:nvSpPr>
+        <p:spPr/>
+        <p:txBody>
+          <a:bodyPr/>
+          <a:lstStyle/>
+          <a:p>
+            <a:pPr>
+              <a:defRPr/>
+            </a:pPr>
+            <a:fld id="{77EF9825-4C23-4085-A4E3-B5565466BD91}" type="slidenum">
+              <a:rPr lang="en-US" smtClean="0"/>
+              <a:pPr>
+                <a:defRPr/>
+              </a:pPr>
+              <a:t>36</a:t>
+            </a:fld>
+            <a:endParaRPr lang="en-US" dirty="0"/>
+          </a:p>
+        </p:txBody>
+      </p:sp>
+    </p:spTree>
+    <p:extLst>
+      <p:ext uri="{BB962C8B-B14F-4D97-AF65-F5344CB8AC3E}">
+        <p14:creationId xmlns:p14="http://schemas.microsoft.com/office/powerpoint/2010/main" val="1474599338"/>
+      </p:ext>
+    </p:extLst>
+  </p:cSld>
+  <p:clrMapOvr>
+    <a:masterClrMapping/>
+  </p:clrMapOvr>
+</p:sld>
+</file>
+
+<file path=ppt/slides/slide37.xml><?xml version="1.0" encoding="utf-8"?>
+<p:sld xmlns:a="http://schemas.openxmlformats.org/drawingml/2006/main" xmlns:r="http://schemas.openxmlformats.org/officeDocument/2006/relationships" xmlns:p="http://schemas.openxmlformats.org/presentationml/2006/main">
+  <p:cSld>
+    <p:spTree>
+      <p:nvGrpSpPr>
+        <p:cNvPr id="1" name=""/>
+        <p:cNvGrpSpPr/>
+        <p:nvPr/>
+      </p:nvGrpSpPr>
+      <p:grpSpPr>
+        <a:xfrm>
+          <a:off x="0" y="0"/>
+          <a:ext cx="0" cy="0"/>
+          <a:chOff x="0" y="0"/>
+          <a:chExt cx="0" cy="0"/>
+        </a:xfrm>
+      </p:grpSpPr>
+      <p:sp>
+        <p:nvSpPr>
+          <p:cNvPr id="2" name="Title 1">
+            <a:extLst>
+              <a:ext uri="{FF2B5EF4-FFF2-40B4-BE49-F238E27FC236}">
+                <a16:creationId xmlns:a16="http://schemas.microsoft.com/office/drawing/2014/main" id="{74248A32-62D4-47B6-8A08-F86B35BE7E1B}"/>
+              </a:ext>
+            </a:extLst>
+          </p:cNvPr>
+          <p:cNvSpPr>
+            <a:spLocks noGrp="1"/>
+          </p:cNvSpPr>
+          <p:nvPr>
+            <p:ph type="title"/>
+          </p:nvPr>
+        </p:nvSpPr>
+        <p:spPr/>
+        <p:txBody>
+          <a:bodyPr/>
+          <a:lstStyle/>
+          <a:p>
+            <a:r>
+              <a:rPr lang="en-CA" dirty="0" err="1"/>
+              <a:t>DevSecOps</a:t>
+            </a:r>
+            <a:r>
+              <a:rPr lang="en-CA" dirty="0"/>
+              <a:t> Best Practices</a:t>
+            </a:r>
+          </a:p>
+        </p:txBody>
+      </p:sp>
+      <p:sp>
+        <p:nvSpPr>
+          <p:cNvPr id="3" name="Content Placeholder 2">
+            <a:extLst>
+              <a:ext uri="{FF2B5EF4-FFF2-40B4-BE49-F238E27FC236}">
+                <a16:creationId xmlns:a16="http://schemas.microsoft.com/office/drawing/2014/main" id="{6552F386-F9B6-4B90-A2E0-8A3813047BB8}"/>
+              </a:ext>
+            </a:extLst>
+          </p:cNvPr>
+          <p:cNvSpPr>
+            <a:spLocks noGrp="1"/>
+          </p:cNvSpPr>
+          <p:nvPr>
+            <p:ph idx="1"/>
+          </p:nvPr>
+        </p:nvSpPr>
+        <p:spPr/>
+        <p:txBody>
+          <a:bodyPr/>
+          <a:lstStyle/>
+          <a:p>
+            <a:r>
+              <a:rPr lang="en-CA" dirty="0"/>
+              <a:t>Shift left</a:t>
+            </a:r>
+          </a:p>
+          <a:p>
+            <a:pPr lvl="1"/>
+            <a:r>
+              <a:rPr lang="en-CA" dirty="0"/>
+              <a:t>Moves security from the end of a process left to the start of the development process</a:t>
+            </a:r>
+          </a:p>
+          <a:p>
+            <a:pPr lvl="1"/>
+            <a:r>
+              <a:rPr lang="en-CA" dirty="0"/>
+              <a:t>Security is an integral part of the development process from the start</a:t>
+            </a:r>
+          </a:p>
+          <a:p>
+            <a:r>
+              <a:rPr lang="en-CA" dirty="0"/>
+              <a:t>Security education</a:t>
+            </a:r>
+          </a:p>
+          <a:p>
+            <a:pPr lvl="1"/>
+            <a:r>
+              <a:rPr lang="en-US" dirty="0"/>
+              <a:t>Combination of engineering and compliance</a:t>
+            </a:r>
+          </a:p>
+          <a:p>
+            <a:pPr lvl="1"/>
+            <a:r>
+              <a:rPr lang="en-US" dirty="0"/>
+              <a:t>Requires development engineers, operations teams, and compliance teams work together</a:t>
+            </a:r>
+          </a:p>
+          <a:p>
+            <a:pPr lvl="1"/>
+            <a:r>
+              <a:rPr lang="en-US" dirty="0"/>
+              <a:t>Ensures everyone understands the required security posture and follows the same standards</a:t>
+            </a:r>
+          </a:p>
+          <a:p>
+            <a:r>
+              <a:rPr lang="en-CA" dirty="0"/>
+              <a:t>Traceability, auditability, and visibility</a:t>
+            </a:r>
+          </a:p>
+          <a:p>
+            <a:pPr lvl="1"/>
+            <a:r>
+              <a:rPr lang="en-US" i="1" dirty="0"/>
+              <a:t>Traceability</a:t>
+            </a:r>
+            <a:r>
+              <a:rPr lang="en-US" dirty="0"/>
+              <a:t>: tracking configuration items across the development cycle from requirements to implemented code </a:t>
+            </a:r>
+          </a:p>
+          <a:p>
+            <a:pPr lvl="1"/>
+            <a:r>
+              <a:rPr lang="en-US" i="1" dirty="0"/>
+              <a:t>Auditability</a:t>
+            </a:r>
+            <a:r>
+              <a:rPr lang="en-US" dirty="0"/>
+              <a:t>: ensuring compliance with security protocols</a:t>
+            </a:r>
+          </a:p>
+          <a:p>
+            <a:pPr lvl="1"/>
+            <a:r>
+              <a:rPr lang="en-CA" i="1" dirty="0"/>
+              <a:t>Visibility</a:t>
+            </a:r>
+            <a:r>
+              <a:rPr lang="en-CA" dirty="0"/>
+              <a:t>:  solid monitoring system in place during whole product lifecycle</a:t>
+            </a:r>
+          </a:p>
+        </p:txBody>
+      </p:sp>
+      <p:sp>
+        <p:nvSpPr>
+          <p:cNvPr id="4" name="Footer Placeholder 3">
+            <a:extLst>
+              <a:ext uri="{FF2B5EF4-FFF2-40B4-BE49-F238E27FC236}">
+                <a16:creationId xmlns:a16="http://schemas.microsoft.com/office/drawing/2014/main" id="{57E0842C-CB3E-42A0-89F5-0D8D42CABA7C}"/>
+              </a:ext>
+            </a:extLst>
+          </p:cNvPr>
+          <p:cNvSpPr>
+            <a:spLocks noGrp="1"/>
+          </p:cNvSpPr>
+          <p:nvPr>
+            <p:ph type="ftr" sz="quarter" idx="11"/>
+          </p:nvPr>
+        </p:nvSpPr>
+        <p:spPr/>
+        <p:txBody>
+          <a:bodyPr/>
+          <a:lstStyle/>
+          <a:p>
+            <a:pPr algn="l">
+              <a:defRPr/>
+            </a:pPr>
+            <a:r>
+              <a:rPr lang="en-US"/>
+              <a:t>Copyright © 2021 Elephant Scale. All rights reserved.</a:t>
+            </a:r>
+            <a:endParaRPr lang="en-US" dirty="0"/>
+          </a:p>
+        </p:txBody>
+      </p:sp>
+      <p:sp>
+        <p:nvSpPr>
+          <p:cNvPr id="5" name="Slide Number Placeholder 4">
+            <a:extLst>
+              <a:ext uri="{FF2B5EF4-FFF2-40B4-BE49-F238E27FC236}">
+                <a16:creationId xmlns:a16="http://schemas.microsoft.com/office/drawing/2014/main" id="{672D6B77-6171-461A-921F-8E779BA0048A}"/>
+              </a:ext>
+            </a:extLst>
+          </p:cNvPr>
+          <p:cNvSpPr>
+            <a:spLocks noGrp="1"/>
+          </p:cNvSpPr>
+          <p:nvPr>
+            <p:ph type="sldNum" sz="quarter" idx="12"/>
+          </p:nvPr>
+        </p:nvSpPr>
+        <p:spPr/>
+        <p:txBody>
+          <a:bodyPr/>
+          <a:lstStyle/>
+          <a:p>
+            <a:pPr>
+              <a:defRPr/>
+            </a:pPr>
+            <a:fld id="{77EF9825-4C23-4085-A4E3-B5565466BD91}" type="slidenum">
+              <a:rPr lang="en-US" smtClean="0"/>
+              <a:pPr>
+                <a:defRPr/>
+              </a:pPr>
+              <a:t>37</a:t>
+            </a:fld>
+            <a:endParaRPr lang="en-US" dirty="0"/>
+          </a:p>
+        </p:txBody>
+      </p:sp>
+    </p:spTree>
+    <p:extLst>
+      <p:ext uri="{BB962C8B-B14F-4D97-AF65-F5344CB8AC3E}">
+        <p14:creationId xmlns:p14="http://schemas.microsoft.com/office/powerpoint/2010/main" val="2919527785"/>
       </p:ext>
     </p:extLst>
   </p:cSld>

</xml_diff>